<commit_message>
W8 Jupyter lesson complete
</commit_message>
<xml_diff>
--- a/w8_jupyter_notebooks/w11_jupyter.pptx
+++ b/w8_jupyter_notebooks/w11_jupyter.pptx
@@ -24,6 +24,23 @@
     <p:sldId id="273" r:id="rId18"/>
     <p:sldId id="274" r:id="rId19"/>
     <p:sldId id="275" r:id="rId20"/>
+    <p:sldId id="276" r:id="rId21"/>
+    <p:sldId id="277" r:id="rId22"/>
+    <p:sldId id="278" r:id="rId23"/>
+    <p:sldId id="279" r:id="rId24"/>
+    <p:sldId id="280" r:id="rId25"/>
+    <p:sldId id="281" r:id="rId26"/>
+    <p:sldId id="282" r:id="rId27"/>
+    <p:sldId id="283" r:id="rId28"/>
+    <p:sldId id="286" r:id="rId29"/>
+    <p:sldId id="285" r:id="rId30"/>
+    <p:sldId id="287" r:id="rId31"/>
+    <p:sldId id="284" r:id="rId32"/>
+    <p:sldId id="288" r:id="rId33"/>
+    <p:sldId id="289" r:id="rId34"/>
+    <p:sldId id="290" r:id="rId35"/>
+    <p:sldId id="291" r:id="rId36"/>
+    <p:sldId id="292" r:id="rId37"/>
   </p:sldIdLst>
   <p:sldSz cx="12192000" cy="6858000"/>
   <p:notesSz cx="6888163" cy="10018713"/>
@@ -158,10 +175,32 @@
         <p14:section name="Jupyter- how to - part 2" id="{D0B96FE9-0242-4EA8-B3A6-27E334820619}">
           <p14:sldIdLst>
             <p14:sldId id="275"/>
+            <p14:sldId id="276"/>
+            <p14:sldId id="277"/>
           </p14:sldIdLst>
         </p14:section>
-        <p14:section name="Jupyter - setup" id="{802657D7-BFB6-4900-9C5E-A3A2B517CB51}">
-          <p14:sldIdLst/>
+        <p14:section name="Final 2 Assignments" id="{802657D7-BFB6-4900-9C5E-A3A2B517CB51}">
+          <p14:sldIdLst>
+            <p14:sldId id="278"/>
+            <p14:sldId id="279"/>
+            <p14:sldId id="280"/>
+            <p14:sldId id="281"/>
+            <p14:sldId id="282"/>
+            <p14:sldId id="283"/>
+            <p14:sldId id="286"/>
+            <p14:sldId id="285"/>
+            <p14:sldId id="287"/>
+            <p14:sldId id="284"/>
+          </p14:sldIdLst>
+        </p14:section>
+        <p14:section name="MarkDown" id="{73FB5373-0E22-43E1-A0FB-3E426252BF0C}">
+          <p14:sldIdLst>
+            <p14:sldId id="288"/>
+            <p14:sldId id="289"/>
+            <p14:sldId id="290"/>
+            <p14:sldId id="291"/>
+            <p14:sldId id="292"/>
+          </p14:sldIdLst>
         </p14:section>
       </p14:sectionLst>
     </p:ext>
@@ -186,7 +225,7 @@
 <file path=ppt/revisionInfo.xml><?xml version="1.0" encoding="utf-8"?>
 <p1510:revInfo xmlns:a="http://schemas.openxmlformats.org/drawingml/2006/main" xmlns:r="http://schemas.openxmlformats.org/officeDocument/2006/relationships" xmlns:p1510="http://schemas.microsoft.com/office/powerpoint/2015/10/main">
   <p1510:revLst>
-    <p1510:client id="{907E0E86-300A-4775-BCFF-EEFF4AB40053}" v="19" dt="2021-11-10T15:44:16.910"/>
+    <p1510:client id="{E5BE7CA5-6FDA-4509-A6DF-FC0C81693BBC}" v="2" dt="2021-11-13T11:16:32.997"/>
   </p1510:revLst>
 </p1510:revInfo>
 </file>
@@ -818,6 +857,452 @@
             <pc:docMk/>
             <pc:sldMk cId="4168802931" sldId="275"/>
             <ac:spMk id="3" creationId="{AEE27473-9E95-46AE-B7D7-B3B35355C245}"/>
+          </ac:spMkLst>
+        </pc:spChg>
+      </pc:sldChg>
+    </pc:docChg>
+  </pc:docChgLst>
+  <pc:docChgLst>
+    <pc:chgData name="Peter McGinty" userId="138e04b35f3df159" providerId="LiveId" clId="{E5BE7CA5-6FDA-4509-A6DF-FC0C81693BBC}"/>
+    <pc:docChg chg="custSel addSld modSld sldOrd addSection modSection">
+      <pc:chgData name="Peter McGinty" userId="138e04b35f3df159" providerId="LiveId" clId="{E5BE7CA5-6FDA-4509-A6DF-FC0C81693BBC}" dt="2021-11-14T18:22:29.892" v="6130" actId="20577"/>
+      <pc:docMkLst>
+        <pc:docMk/>
+      </pc:docMkLst>
+      <pc:sldChg chg="modSp mod">
+        <pc:chgData name="Peter McGinty" userId="138e04b35f3df159" providerId="LiveId" clId="{E5BE7CA5-6FDA-4509-A6DF-FC0C81693BBC}" dt="2021-11-14T18:20:52.660" v="6050"/>
+        <pc:sldMkLst>
+          <pc:docMk/>
+          <pc:sldMk cId="1263877667" sldId="257"/>
+        </pc:sldMkLst>
+        <pc:spChg chg="mod">
+          <ac:chgData name="Peter McGinty" userId="138e04b35f3df159" providerId="LiveId" clId="{E5BE7CA5-6FDA-4509-A6DF-FC0C81693BBC}" dt="2021-11-14T18:20:52.660" v="6050"/>
+          <ac:spMkLst>
+            <pc:docMk/>
+            <pc:sldMk cId="1263877667" sldId="257"/>
+            <ac:spMk id="3" creationId="{2A5FFB63-AB60-4904-8884-17ABD0C6535F}"/>
+          </ac:spMkLst>
+        </pc:spChg>
+      </pc:sldChg>
+      <pc:sldChg chg="modSp mod">
+        <pc:chgData name="Peter McGinty" userId="138e04b35f3df159" providerId="LiveId" clId="{E5BE7CA5-6FDA-4509-A6DF-FC0C81693BBC}" dt="2021-11-11T13:28:50.202" v="0" actId="20577"/>
+        <pc:sldMkLst>
+          <pc:docMk/>
+          <pc:sldMk cId="4122690984" sldId="264"/>
+        </pc:sldMkLst>
+        <pc:spChg chg="mod">
+          <ac:chgData name="Peter McGinty" userId="138e04b35f3df159" providerId="LiveId" clId="{E5BE7CA5-6FDA-4509-A6DF-FC0C81693BBC}" dt="2021-11-11T13:28:50.202" v="0" actId="20577"/>
+          <ac:spMkLst>
+            <pc:docMk/>
+            <pc:sldMk cId="4122690984" sldId="264"/>
+            <ac:spMk id="3" creationId="{AEE27473-9E95-46AE-B7D7-B3B35355C245}"/>
+          </ac:spMkLst>
+        </pc:spChg>
+      </pc:sldChg>
+      <pc:sldChg chg="modSp new mod">
+        <pc:chgData name="Peter McGinty" userId="138e04b35f3df159" providerId="LiveId" clId="{E5BE7CA5-6FDA-4509-A6DF-FC0C81693BBC}" dt="2021-11-11T21:41:01.499" v="365" actId="6549"/>
+        <pc:sldMkLst>
+          <pc:docMk/>
+          <pc:sldMk cId="4111324460" sldId="276"/>
+        </pc:sldMkLst>
+        <pc:spChg chg="mod">
+          <ac:chgData name="Peter McGinty" userId="138e04b35f3df159" providerId="LiveId" clId="{E5BE7CA5-6FDA-4509-A6DF-FC0C81693BBC}" dt="2021-11-11T21:23:08.631" v="9" actId="20577"/>
+          <ac:spMkLst>
+            <pc:docMk/>
+            <pc:sldMk cId="4111324460" sldId="276"/>
+            <ac:spMk id="2" creationId="{441EB75A-6CD7-49F8-8617-C1898F13FB96}"/>
+          </ac:spMkLst>
+        </pc:spChg>
+        <pc:spChg chg="mod">
+          <ac:chgData name="Peter McGinty" userId="138e04b35f3df159" providerId="LiveId" clId="{E5BE7CA5-6FDA-4509-A6DF-FC0C81693BBC}" dt="2021-11-11T21:41:01.499" v="365" actId="6549"/>
+          <ac:spMkLst>
+            <pc:docMk/>
+            <pc:sldMk cId="4111324460" sldId="276"/>
+            <ac:spMk id="3" creationId="{EEB801AC-8839-4BE7-A095-06E857F29301}"/>
+          </ac:spMkLst>
+        </pc:spChg>
+      </pc:sldChg>
+      <pc:sldChg chg="modSp new mod">
+        <pc:chgData name="Peter McGinty" userId="138e04b35f3df159" providerId="LiveId" clId="{E5BE7CA5-6FDA-4509-A6DF-FC0C81693BBC}" dt="2021-11-11T21:41:57.754" v="420" actId="20577"/>
+        <pc:sldMkLst>
+          <pc:docMk/>
+          <pc:sldMk cId="961299510" sldId="277"/>
+        </pc:sldMkLst>
+        <pc:spChg chg="mod">
+          <ac:chgData name="Peter McGinty" userId="138e04b35f3df159" providerId="LiveId" clId="{E5BE7CA5-6FDA-4509-A6DF-FC0C81693BBC}" dt="2021-11-11T21:41:57.754" v="420" actId="20577"/>
+          <ac:spMkLst>
+            <pc:docMk/>
+            <pc:sldMk cId="961299510" sldId="277"/>
+            <ac:spMk id="2" creationId="{C12AD9CD-64E9-4B97-A9D9-F0D2F4189989}"/>
+          </ac:spMkLst>
+        </pc:spChg>
+      </pc:sldChg>
+      <pc:sldChg chg="modSp new mod">
+        <pc:chgData name="Peter McGinty" userId="138e04b35f3df159" providerId="LiveId" clId="{E5BE7CA5-6FDA-4509-A6DF-FC0C81693BBC}" dt="2021-11-11T21:43:18.786" v="473" actId="20577"/>
+        <pc:sldMkLst>
+          <pc:docMk/>
+          <pc:sldMk cId="3388677663" sldId="278"/>
+        </pc:sldMkLst>
+        <pc:spChg chg="mod">
+          <ac:chgData name="Peter McGinty" userId="138e04b35f3df159" providerId="LiveId" clId="{E5BE7CA5-6FDA-4509-A6DF-FC0C81693BBC}" dt="2021-11-11T21:42:54.849" v="433" actId="20577"/>
+          <ac:spMkLst>
+            <pc:docMk/>
+            <pc:sldMk cId="3388677663" sldId="278"/>
+            <ac:spMk id="2" creationId="{BED0E312-7C8F-4752-889E-18861DC53220}"/>
+          </ac:spMkLst>
+        </pc:spChg>
+        <pc:spChg chg="mod">
+          <ac:chgData name="Peter McGinty" userId="138e04b35f3df159" providerId="LiveId" clId="{E5BE7CA5-6FDA-4509-A6DF-FC0C81693BBC}" dt="2021-11-11T21:43:18.786" v="473" actId="20577"/>
+          <ac:spMkLst>
+            <pc:docMk/>
+            <pc:sldMk cId="3388677663" sldId="278"/>
+            <ac:spMk id="3" creationId="{00641CF9-0B86-4E07-99F7-25948BFC9E2F}"/>
+          </ac:spMkLst>
+        </pc:spChg>
+      </pc:sldChg>
+      <pc:sldChg chg="modSp new mod">
+        <pc:chgData name="Peter McGinty" userId="138e04b35f3df159" providerId="LiveId" clId="{E5BE7CA5-6FDA-4509-A6DF-FC0C81693BBC}" dt="2021-11-11T21:43:44.586" v="504" actId="20577"/>
+        <pc:sldMkLst>
+          <pc:docMk/>
+          <pc:sldMk cId="1589586033" sldId="279"/>
+        </pc:sldMkLst>
+        <pc:spChg chg="mod">
+          <ac:chgData name="Peter McGinty" userId="138e04b35f3df159" providerId="LiveId" clId="{E5BE7CA5-6FDA-4509-A6DF-FC0C81693BBC}" dt="2021-11-11T21:43:44.586" v="504" actId="20577"/>
+          <ac:spMkLst>
+            <pc:docMk/>
+            <pc:sldMk cId="1589586033" sldId="279"/>
+            <ac:spMk id="2" creationId="{9B0EFFC5-828E-445D-8692-4FE74BFE9178}"/>
+          </ac:spMkLst>
+        </pc:spChg>
+      </pc:sldChg>
+      <pc:sldChg chg="modSp new mod">
+        <pc:chgData name="Peter McGinty" userId="138e04b35f3df159" providerId="LiveId" clId="{E5BE7CA5-6FDA-4509-A6DF-FC0C81693BBC}" dt="2021-11-11T21:45:13.146" v="591" actId="313"/>
+        <pc:sldMkLst>
+          <pc:docMk/>
+          <pc:sldMk cId="3760159532" sldId="280"/>
+        </pc:sldMkLst>
+        <pc:spChg chg="mod">
+          <ac:chgData name="Peter McGinty" userId="138e04b35f3df159" providerId="LiveId" clId="{E5BE7CA5-6FDA-4509-A6DF-FC0C81693BBC}" dt="2021-11-11T21:44:49.733" v="553" actId="21"/>
+          <ac:spMkLst>
+            <pc:docMk/>
+            <pc:sldMk cId="3760159532" sldId="280"/>
+            <ac:spMk id="2" creationId="{474C5F92-1942-4258-ACE7-04A01D1BF67D}"/>
+          </ac:spMkLst>
+        </pc:spChg>
+        <pc:spChg chg="mod">
+          <ac:chgData name="Peter McGinty" userId="138e04b35f3df159" providerId="LiveId" clId="{E5BE7CA5-6FDA-4509-A6DF-FC0C81693BBC}" dt="2021-11-11T21:45:13.146" v="591" actId="313"/>
+          <ac:spMkLst>
+            <pc:docMk/>
+            <pc:sldMk cId="3760159532" sldId="280"/>
+            <ac:spMk id="3" creationId="{9F0F1AD1-7D37-4508-B4F6-4DBC8730BDE2}"/>
+          </ac:spMkLst>
+        </pc:spChg>
+      </pc:sldChg>
+      <pc:sldChg chg="modSp new mod">
+        <pc:chgData name="Peter McGinty" userId="138e04b35f3df159" providerId="LiveId" clId="{E5BE7CA5-6FDA-4509-A6DF-FC0C81693BBC}" dt="2021-11-14T07:01:42.180" v="5249" actId="20577"/>
+        <pc:sldMkLst>
+          <pc:docMk/>
+          <pc:sldMk cId="2562719481" sldId="281"/>
+        </pc:sldMkLst>
+        <pc:spChg chg="mod">
+          <ac:chgData name="Peter McGinty" userId="138e04b35f3df159" providerId="LiveId" clId="{E5BE7CA5-6FDA-4509-A6DF-FC0C81693BBC}" dt="2021-11-14T07:01:42.180" v="5249" actId="20577"/>
+          <ac:spMkLst>
+            <pc:docMk/>
+            <pc:sldMk cId="2562719481" sldId="281"/>
+            <ac:spMk id="2" creationId="{3B8B7557-8E1B-4C5B-AAE2-BA8BF82D6010}"/>
+          </ac:spMkLst>
+        </pc:spChg>
+        <pc:spChg chg="mod">
+          <ac:chgData name="Peter McGinty" userId="138e04b35f3df159" providerId="LiveId" clId="{E5BE7CA5-6FDA-4509-A6DF-FC0C81693BBC}" dt="2021-11-13T11:26:48.157" v="3559" actId="20577"/>
+          <ac:spMkLst>
+            <pc:docMk/>
+            <pc:sldMk cId="2562719481" sldId="281"/>
+            <ac:spMk id="3" creationId="{DDA0DD76-F54F-45A1-BE97-63EC9AE2A66A}"/>
+          </ac:spMkLst>
+        </pc:spChg>
+      </pc:sldChg>
+      <pc:sldChg chg="modSp add mod">
+        <pc:chgData name="Peter McGinty" userId="138e04b35f3df159" providerId="LiveId" clId="{E5BE7CA5-6FDA-4509-A6DF-FC0C81693BBC}" dt="2021-11-13T11:54:31.580" v="4541" actId="20577"/>
+        <pc:sldMkLst>
+          <pc:docMk/>
+          <pc:sldMk cId="3322056478" sldId="282"/>
+        </pc:sldMkLst>
+        <pc:spChg chg="mod">
+          <ac:chgData name="Peter McGinty" userId="138e04b35f3df159" providerId="LiveId" clId="{E5BE7CA5-6FDA-4509-A6DF-FC0C81693BBC}" dt="2021-11-13T11:54:31.580" v="4541" actId="20577"/>
+          <ac:spMkLst>
+            <pc:docMk/>
+            <pc:sldMk cId="3322056478" sldId="282"/>
+            <ac:spMk id="2" creationId="{3B8B7557-8E1B-4C5B-AAE2-BA8BF82D6010}"/>
+          </ac:spMkLst>
+        </pc:spChg>
+        <pc:spChg chg="mod">
+          <ac:chgData name="Peter McGinty" userId="138e04b35f3df159" providerId="LiveId" clId="{E5BE7CA5-6FDA-4509-A6DF-FC0C81693BBC}" dt="2021-11-13T11:21:41.679" v="3410" actId="20577"/>
+          <ac:spMkLst>
+            <pc:docMk/>
+            <pc:sldMk cId="3322056478" sldId="282"/>
+            <ac:spMk id="3" creationId="{DDA0DD76-F54F-45A1-BE97-63EC9AE2A66A}"/>
+          </ac:spMkLst>
+        </pc:spChg>
+      </pc:sldChg>
+      <pc:sldChg chg="modSp add mod">
+        <pc:chgData name="Peter McGinty" userId="138e04b35f3df159" providerId="LiveId" clId="{E5BE7CA5-6FDA-4509-A6DF-FC0C81693BBC}" dt="2021-11-14T15:35:23.320" v="5251" actId="20577"/>
+        <pc:sldMkLst>
+          <pc:docMk/>
+          <pc:sldMk cId="3947401188" sldId="283"/>
+        </pc:sldMkLst>
+        <pc:spChg chg="mod">
+          <ac:chgData name="Peter McGinty" userId="138e04b35f3df159" providerId="LiveId" clId="{E5BE7CA5-6FDA-4509-A6DF-FC0C81693BBC}" dt="2021-11-13T11:54:53.572" v="4555" actId="20577"/>
+          <ac:spMkLst>
+            <pc:docMk/>
+            <pc:sldMk cId="3947401188" sldId="283"/>
+            <ac:spMk id="2" creationId="{3B8B7557-8E1B-4C5B-AAE2-BA8BF82D6010}"/>
+          </ac:spMkLst>
+        </pc:spChg>
+        <pc:spChg chg="mod">
+          <ac:chgData name="Peter McGinty" userId="138e04b35f3df159" providerId="LiveId" clId="{E5BE7CA5-6FDA-4509-A6DF-FC0C81693BBC}" dt="2021-11-14T15:35:23.320" v="5251" actId="20577"/>
+          <ac:spMkLst>
+            <pc:docMk/>
+            <pc:sldMk cId="3947401188" sldId="283"/>
+            <ac:spMk id="3" creationId="{DDA0DD76-F54F-45A1-BE97-63EC9AE2A66A}"/>
+          </ac:spMkLst>
+        </pc:spChg>
+      </pc:sldChg>
+      <pc:sldChg chg="modSp new mod ord">
+        <pc:chgData name="Peter McGinty" userId="138e04b35f3df159" providerId="LiveId" clId="{E5BE7CA5-6FDA-4509-A6DF-FC0C81693BBC}" dt="2021-11-13T12:30:18.722" v="5207" actId="20577"/>
+        <pc:sldMkLst>
+          <pc:docMk/>
+          <pc:sldMk cId="909355150" sldId="284"/>
+        </pc:sldMkLst>
+        <pc:spChg chg="mod">
+          <ac:chgData name="Peter McGinty" userId="138e04b35f3df159" providerId="LiveId" clId="{E5BE7CA5-6FDA-4509-A6DF-FC0C81693BBC}" dt="2021-11-13T12:03:38.148" v="4808" actId="20577"/>
+          <ac:spMkLst>
+            <pc:docMk/>
+            <pc:sldMk cId="909355150" sldId="284"/>
+            <ac:spMk id="2" creationId="{61A2BF9D-1813-4BCA-AA48-0082CABE99CF}"/>
+          </ac:spMkLst>
+        </pc:spChg>
+        <pc:spChg chg="mod">
+          <ac:chgData name="Peter McGinty" userId="138e04b35f3df159" providerId="LiveId" clId="{E5BE7CA5-6FDA-4509-A6DF-FC0C81693BBC}" dt="2021-11-13T12:30:18.722" v="5207" actId="20577"/>
+          <ac:spMkLst>
+            <pc:docMk/>
+            <pc:sldMk cId="909355150" sldId="284"/>
+            <ac:spMk id="3" creationId="{2A1823AA-7443-40D4-B38E-F7941597D6AF}"/>
+          </ac:spMkLst>
+        </pc:spChg>
+      </pc:sldChg>
+      <pc:sldChg chg="modSp add mod ord">
+        <pc:chgData name="Peter McGinty" userId="138e04b35f3df159" providerId="LiveId" clId="{E5BE7CA5-6FDA-4509-A6DF-FC0C81693BBC}" dt="2021-11-13T12:00:07.515" v="4662" actId="20577"/>
+        <pc:sldMkLst>
+          <pc:docMk/>
+          <pc:sldMk cId="2075561499" sldId="285"/>
+        </pc:sldMkLst>
+        <pc:spChg chg="mod">
+          <ac:chgData name="Peter McGinty" userId="138e04b35f3df159" providerId="LiveId" clId="{E5BE7CA5-6FDA-4509-A6DF-FC0C81693BBC}" dt="2021-11-13T12:00:07.515" v="4662" actId="20577"/>
+          <ac:spMkLst>
+            <pc:docMk/>
+            <pc:sldMk cId="2075561499" sldId="285"/>
+            <ac:spMk id="2" creationId="{3B8B7557-8E1B-4C5B-AAE2-BA8BF82D6010}"/>
+          </ac:spMkLst>
+        </pc:spChg>
+        <pc:spChg chg="mod">
+          <ac:chgData name="Peter McGinty" userId="138e04b35f3df159" providerId="LiveId" clId="{E5BE7CA5-6FDA-4509-A6DF-FC0C81693BBC}" dt="2021-11-13T11:57:01.620" v="4611" actId="20577"/>
+          <ac:spMkLst>
+            <pc:docMk/>
+            <pc:sldMk cId="2075561499" sldId="285"/>
+            <ac:spMk id="3" creationId="{DDA0DD76-F54F-45A1-BE97-63EC9AE2A66A}"/>
+          </ac:spMkLst>
+        </pc:spChg>
+      </pc:sldChg>
+      <pc:sldChg chg="modSp add mod">
+        <pc:chgData name="Peter McGinty" userId="138e04b35f3df159" providerId="LiveId" clId="{E5BE7CA5-6FDA-4509-A6DF-FC0C81693BBC}" dt="2021-11-13T11:59:52.571" v="4648" actId="20577"/>
+        <pc:sldMkLst>
+          <pc:docMk/>
+          <pc:sldMk cId="3458306016" sldId="286"/>
+        </pc:sldMkLst>
+        <pc:spChg chg="mod">
+          <ac:chgData name="Peter McGinty" userId="138e04b35f3df159" providerId="LiveId" clId="{E5BE7CA5-6FDA-4509-A6DF-FC0C81693BBC}" dt="2021-11-13T11:59:52.571" v="4648" actId="20577"/>
+          <ac:spMkLst>
+            <pc:docMk/>
+            <pc:sldMk cId="3458306016" sldId="286"/>
+            <ac:spMk id="2" creationId="{3B8B7557-8E1B-4C5B-AAE2-BA8BF82D6010}"/>
+          </ac:spMkLst>
+        </pc:spChg>
+        <pc:spChg chg="mod">
+          <ac:chgData name="Peter McGinty" userId="138e04b35f3df159" providerId="LiveId" clId="{E5BE7CA5-6FDA-4509-A6DF-FC0C81693BBC}" dt="2021-11-13T11:58:14.201" v="4612" actId="6549"/>
+          <ac:spMkLst>
+            <pc:docMk/>
+            <pc:sldMk cId="3458306016" sldId="286"/>
+            <ac:spMk id="3" creationId="{DDA0DD76-F54F-45A1-BE97-63EC9AE2A66A}"/>
+          </ac:spMkLst>
+        </pc:spChg>
+      </pc:sldChg>
+      <pc:sldChg chg="modSp add mod">
+        <pc:chgData name="Peter McGinty" userId="138e04b35f3df159" providerId="LiveId" clId="{E5BE7CA5-6FDA-4509-A6DF-FC0C81693BBC}" dt="2021-11-13T12:02:52.084" v="4779" actId="6549"/>
+        <pc:sldMkLst>
+          <pc:docMk/>
+          <pc:sldMk cId="529706538" sldId="287"/>
+        </pc:sldMkLst>
+        <pc:spChg chg="mod">
+          <ac:chgData name="Peter McGinty" userId="138e04b35f3df159" providerId="LiveId" clId="{E5BE7CA5-6FDA-4509-A6DF-FC0C81693BBC}" dt="2021-11-13T12:01:09.418" v="4665" actId="20577"/>
+          <ac:spMkLst>
+            <pc:docMk/>
+            <pc:sldMk cId="529706538" sldId="287"/>
+            <ac:spMk id="2" creationId="{3B8B7557-8E1B-4C5B-AAE2-BA8BF82D6010}"/>
+          </ac:spMkLst>
+        </pc:spChg>
+        <pc:spChg chg="mod">
+          <ac:chgData name="Peter McGinty" userId="138e04b35f3df159" providerId="LiveId" clId="{E5BE7CA5-6FDA-4509-A6DF-FC0C81693BBC}" dt="2021-11-13T12:02:52.084" v="4779" actId="6549"/>
+          <ac:spMkLst>
+            <pc:docMk/>
+            <pc:sldMk cId="529706538" sldId="287"/>
+            <ac:spMk id="3" creationId="{DDA0DD76-F54F-45A1-BE97-63EC9AE2A66A}"/>
+          </ac:spMkLst>
+        </pc:spChg>
+      </pc:sldChg>
+      <pc:sldChg chg="modSp new mod">
+        <pc:chgData name="Peter McGinty" userId="138e04b35f3df159" providerId="LiveId" clId="{E5BE7CA5-6FDA-4509-A6DF-FC0C81693BBC}" dt="2021-11-14T15:35:59.727" v="5278" actId="20577"/>
+        <pc:sldMkLst>
+          <pc:docMk/>
+          <pc:sldMk cId="2149790795" sldId="288"/>
+        </pc:sldMkLst>
+        <pc:spChg chg="mod">
+          <ac:chgData name="Peter McGinty" userId="138e04b35f3df159" providerId="LiveId" clId="{E5BE7CA5-6FDA-4509-A6DF-FC0C81693BBC}" dt="2021-11-14T06:43:00.888" v="5218" actId="20577"/>
+          <ac:spMkLst>
+            <pc:docMk/>
+            <pc:sldMk cId="2149790795" sldId="288"/>
+            <ac:spMk id="2" creationId="{9EA3C4C8-AB99-40B0-B082-4934ADD40397}"/>
+          </ac:spMkLst>
+        </pc:spChg>
+        <pc:spChg chg="mod">
+          <ac:chgData name="Peter McGinty" userId="138e04b35f3df159" providerId="LiveId" clId="{E5BE7CA5-6FDA-4509-A6DF-FC0C81693BBC}" dt="2021-11-14T15:35:59.727" v="5278" actId="20577"/>
+          <ac:spMkLst>
+            <pc:docMk/>
+            <pc:sldMk cId="2149790795" sldId="288"/>
+            <ac:spMk id="3" creationId="{E40F044D-AB5D-4817-8638-E8674D6D793C}"/>
+          </ac:spMkLst>
+        </pc:spChg>
+      </pc:sldChg>
+      <pc:sldChg chg="addSp delSp modSp new mod modClrScheme chgLayout">
+        <pc:chgData name="Peter McGinty" userId="138e04b35f3df159" providerId="LiveId" clId="{E5BE7CA5-6FDA-4509-A6DF-FC0C81693BBC}" dt="2021-11-14T16:48:14.596" v="5351" actId="1035"/>
+        <pc:sldMkLst>
+          <pc:docMk/>
+          <pc:sldMk cId="286071469" sldId="289"/>
+        </pc:sldMkLst>
+        <pc:spChg chg="del mod ord">
+          <ac:chgData name="Peter McGinty" userId="138e04b35f3df159" providerId="LiveId" clId="{E5BE7CA5-6FDA-4509-A6DF-FC0C81693BBC}" dt="2021-11-14T16:46:57.800" v="5308" actId="478"/>
+          <ac:spMkLst>
+            <pc:docMk/>
+            <pc:sldMk cId="286071469" sldId="289"/>
+            <ac:spMk id="2" creationId="{8F1CC519-7703-45C4-ADDE-E4BFD55B64C4}"/>
+          </ac:spMkLst>
+        </pc:spChg>
+        <pc:picChg chg="add mod ord">
+          <ac:chgData name="Peter McGinty" userId="138e04b35f3df159" providerId="LiveId" clId="{E5BE7CA5-6FDA-4509-A6DF-FC0C81693BBC}" dt="2021-11-14T16:48:14.596" v="5351" actId="1035"/>
+          <ac:picMkLst>
+            <pc:docMk/>
+            <pc:sldMk cId="286071469" sldId="289"/>
+            <ac:picMk id="4" creationId="{EA7A5E45-A25B-4379-BF62-4820F491607A}"/>
+          </ac:picMkLst>
+        </pc:picChg>
+        <pc:picChg chg="add mod">
+          <ac:chgData name="Peter McGinty" userId="138e04b35f3df159" providerId="LiveId" clId="{E5BE7CA5-6FDA-4509-A6DF-FC0C81693BBC}" dt="2021-11-14T16:47:42.498" v="5314" actId="12788"/>
+          <ac:picMkLst>
+            <pc:docMk/>
+            <pc:sldMk cId="286071469" sldId="289"/>
+            <ac:picMk id="6" creationId="{A0EFA0AE-3AEA-4829-BEB9-CE4589AFC723}"/>
+          </ac:picMkLst>
+        </pc:picChg>
+      </pc:sldChg>
+      <pc:sldChg chg="addSp modSp new mod modClrScheme chgLayout">
+        <pc:chgData name="Peter McGinty" userId="138e04b35f3df159" providerId="LiveId" clId="{E5BE7CA5-6FDA-4509-A6DF-FC0C81693BBC}" dt="2021-11-14T17:11:59.783" v="5720" actId="6549"/>
+        <pc:sldMkLst>
+          <pc:docMk/>
+          <pc:sldMk cId="665662692" sldId="290"/>
+        </pc:sldMkLst>
+        <pc:spChg chg="mod ord">
+          <ac:chgData name="Peter McGinty" userId="138e04b35f3df159" providerId="LiveId" clId="{E5BE7CA5-6FDA-4509-A6DF-FC0C81693BBC}" dt="2021-11-14T17:11:59.783" v="5720" actId="6549"/>
+          <ac:spMkLst>
+            <pc:docMk/>
+            <pc:sldMk cId="665662692" sldId="290"/>
+            <ac:spMk id="2" creationId="{F4E791DF-A973-4C41-A007-F1CD3F3AA1AF}"/>
+          </ac:spMkLst>
+        </pc:spChg>
+        <pc:spChg chg="mod ord">
+          <ac:chgData name="Peter McGinty" userId="138e04b35f3df159" providerId="LiveId" clId="{E5BE7CA5-6FDA-4509-A6DF-FC0C81693BBC}" dt="2021-11-14T17:11:39.437" v="5718" actId="20577"/>
+          <ac:spMkLst>
+            <pc:docMk/>
+            <pc:sldMk cId="665662692" sldId="290"/>
+            <ac:spMk id="3" creationId="{00A9BBF6-F358-4956-A881-978B56B99735}"/>
+          </ac:spMkLst>
+        </pc:spChg>
+        <pc:spChg chg="add mod ord">
+          <ac:chgData name="Peter McGinty" userId="138e04b35f3df159" providerId="LiveId" clId="{E5BE7CA5-6FDA-4509-A6DF-FC0C81693BBC}" dt="2021-11-14T17:11:22.073" v="5714" actId="12"/>
+          <ac:spMkLst>
+            <pc:docMk/>
+            <pc:sldMk cId="665662692" sldId="290"/>
+            <ac:spMk id="4" creationId="{95901C54-1A7F-4FEF-8F0E-C936FC9C7870}"/>
+          </ac:spMkLst>
+        </pc:spChg>
+      </pc:sldChg>
+      <pc:sldChg chg="addSp delSp modSp new mod">
+        <pc:chgData name="Peter McGinty" userId="138e04b35f3df159" providerId="LiveId" clId="{E5BE7CA5-6FDA-4509-A6DF-FC0C81693BBC}" dt="2021-11-14T17:24:18.637" v="5786" actId="20577"/>
+        <pc:sldMkLst>
+          <pc:docMk/>
+          <pc:sldMk cId="2031365247" sldId="291"/>
+        </pc:sldMkLst>
+        <pc:spChg chg="mod">
+          <ac:chgData name="Peter McGinty" userId="138e04b35f3df159" providerId="LiveId" clId="{E5BE7CA5-6FDA-4509-A6DF-FC0C81693BBC}" dt="2021-11-14T17:23:57.325" v="5742" actId="20577"/>
+          <ac:spMkLst>
+            <pc:docMk/>
+            <pc:sldMk cId="2031365247" sldId="291"/>
+            <ac:spMk id="2" creationId="{E683B49C-1482-46BE-BE0B-630F901867BA}"/>
+          </ac:spMkLst>
+        </pc:spChg>
+        <pc:spChg chg="del">
+          <ac:chgData name="Peter McGinty" userId="138e04b35f3df159" providerId="LiveId" clId="{E5BE7CA5-6FDA-4509-A6DF-FC0C81693BBC}" dt="2021-11-14T17:23:31.260" v="5722" actId="478"/>
+          <ac:spMkLst>
+            <pc:docMk/>
+            <pc:sldMk cId="2031365247" sldId="291"/>
+            <ac:spMk id="3" creationId="{FBC88572-FF91-4602-9669-5A7BEC103A9A}"/>
+          </ac:spMkLst>
+        </pc:spChg>
+        <pc:spChg chg="mod">
+          <ac:chgData name="Peter McGinty" userId="138e04b35f3df159" providerId="LiveId" clId="{E5BE7CA5-6FDA-4509-A6DF-FC0C81693BBC}" dt="2021-11-14T17:24:18.637" v="5786" actId="20577"/>
+          <ac:spMkLst>
+            <pc:docMk/>
+            <pc:sldMk cId="2031365247" sldId="291"/>
+            <ac:spMk id="4" creationId="{6BEEFE95-563F-4B5F-99F6-17DA5783DA11}"/>
+          </ac:spMkLst>
+        </pc:spChg>
+        <pc:picChg chg="add mod">
+          <ac:chgData name="Peter McGinty" userId="138e04b35f3df159" providerId="LiveId" clId="{E5BE7CA5-6FDA-4509-A6DF-FC0C81693BBC}" dt="2021-11-14T17:23:48.780" v="5727" actId="1076"/>
+          <ac:picMkLst>
+            <pc:docMk/>
+            <pc:sldMk cId="2031365247" sldId="291"/>
+            <ac:picMk id="6" creationId="{4FD60452-F35E-49D6-B056-A92FA4EB504B}"/>
+          </ac:picMkLst>
+        </pc:picChg>
+      </pc:sldChg>
+      <pc:sldChg chg="modSp new mod">
+        <pc:chgData name="Peter McGinty" userId="138e04b35f3df159" providerId="LiveId" clId="{E5BE7CA5-6FDA-4509-A6DF-FC0C81693BBC}" dt="2021-11-14T18:22:29.892" v="6130" actId="20577"/>
+        <pc:sldMkLst>
+          <pc:docMk/>
+          <pc:sldMk cId="295967282" sldId="292"/>
+        </pc:sldMkLst>
+        <pc:spChg chg="mod">
+          <ac:chgData name="Peter McGinty" userId="138e04b35f3df159" providerId="LiveId" clId="{E5BE7CA5-6FDA-4509-A6DF-FC0C81693BBC}" dt="2021-11-14T17:27:17.204" v="5994" actId="20577"/>
+          <ac:spMkLst>
+            <pc:docMk/>
+            <pc:sldMk cId="295967282" sldId="292"/>
+            <ac:spMk id="2" creationId="{40BCEAE3-B2E9-4893-9F60-8984C7D38926}"/>
+          </ac:spMkLst>
+        </pc:spChg>
+        <pc:spChg chg="mod">
+          <ac:chgData name="Peter McGinty" userId="138e04b35f3df159" providerId="LiveId" clId="{E5BE7CA5-6FDA-4509-A6DF-FC0C81693BBC}" dt="2021-11-14T18:22:29.892" v="6130" actId="20577"/>
+          <ac:spMkLst>
+            <pc:docMk/>
+            <pc:sldMk cId="295967282" sldId="292"/>
+            <ac:spMk id="3" creationId="{D6130303-D165-4BFC-B88F-99DF12B12710}"/>
           </ac:spMkLst>
         </pc:spChg>
       </pc:sldChg>
@@ -3886,7 +4371,7 @@
           <a:p>
             <a:fld id="{7A192637-BFDA-46FE-B306-083B272C9BF4}" type="datetimeFigureOut">
               <a:rPr lang="en-GB" smtClean="0"/>
-              <a:t>10/11/2021</a:t>
+              <a:t>14/11/2021</a:t>
             </a:fld>
             <a:endParaRPr lang="en-GB"/>
           </a:p>
@@ -4086,7 +4571,7 @@
           <a:p>
             <a:fld id="{7A192637-BFDA-46FE-B306-083B272C9BF4}" type="datetimeFigureOut">
               <a:rPr lang="en-GB" smtClean="0"/>
-              <a:t>10/11/2021</a:t>
+              <a:t>14/11/2021</a:t>
             </a:fld>
             <a:endParaRPr lang="en-GB"/>
           </a:p>
@@ -4296,7 +4781,7 @@
           <a:p>
             <a:fld id="{7A192637-BFDA-46FE-B306-083B272C9BF4}" type="datetimeFigureOut">
               <a:rPr lang="en-GB" smtClean="0"/>
-              <a:t>10/11/2021</a:t>
+              <a:t>14/11/2021</a:t>
             </a:fld>
             <a:endParaRPr lang="en-GB"/>
           </a:p>
@@ -4496,7 +4981,7 @@
           <a:p>
             <a:fld id="{7A192637-BFDA-46FE-B306-083B272C9BF4}" type="datetimeFigureOut">
               <a:rPr lang="en-GB" smtClean="0"/>
-              <a:t>10/11/2021</a:t>
+              <a:t>14/11/2021</a:t>
             </a:fld>
             <a:endParaRPr lang="en-GB"/>
           </a:p>
@@ -4772,7 +5257,7 @@
           <a:p>
             <a:fld id="{7A192637-BFDA-46FE-B306-083B272C9BF4}" type="datetimeFigureOut">
               <a:rPr lang="en-GB" smtClean="0"/>
-              <a:t>10/11/2021</a:t>
+              <a:t>14/11/2021</a:t>
             </a:fld>
             <a:endParaRPr lang="en-GB"/>
           </a:p>
@@ -5040,7 +5525,7 @@
           <a:p>
             <a:fld id="{7A192637-BFDA-46FE-B306-083B272C9BF4}" type="datetimeFigureOut">
               <a:rPr lang="en-GB" smtClean="0"/>
-              <a:t>10/11/2021</a:t>
+              <a:t>14/11/2021</a:t>
             </a:fld>
             <a:endParaRPr lang="en-GB"/>
           </a:p>
@@ -5455,7 +5940,7 @@
           <a:p>
             <a:fld id="{7A192637-BFDA-46FE-B306-083B272C9BF4}" type="datetimeFigureOut">
               <a:rPr lang="en-GB" smtClean="0"/>
-              <a:t>10/11/2021</a:t>
+              <a:t>14/11/2021</a:t>
             </a:fld>
             <a:endParaRPr lang="en-GB"/>
           </a:p>
@@ -5597,7 +6082,7 @@
           <a:p>
             <a:fld id="{7A192637-BFDA-46FE-B306-083B272C9BF4}" type="datetimeFigureOut">
               <a:rPr lang="en-GB" smtClean="0"/>
-              <a:t>10/11/2021</a:t>
+              <a:t>14/11/2021</a:t>
             </a:fld>
             <a:endParaRPr lang="en-GB"/>
           </a:p>
@@ -5710,7 +6195,7 @@
           <a:p>
             <a:fld id="{7A192637-BFDA-46FE-B306-083B272C9BF4}" type="datetimeFigureOut">
               <a:rPr lang="en-GB" smtClean="0"/>
-              <a:t>10/11/2021</a:t>
+              <a:t>14/11/2021</a:t>
             </a:fld>
             <a:endParaRPr lang="en-GB"/>
           </a:p>
@@ -6023,7 +6508,7 @@
           <a:p>
             <a:fld id="{7A192637-BFDA-46FE-B306-083B272C9BF4}" type="datetimeFigureOut">
               <a:rPr lang="en-GB" smtClean="0"/>
-              <a:t>10/11/2021</a:t>
+              <a:t>14/11/2021</a:t>
             </a:fld>
             <a:endParaRPr lang="en-GB"/>
           </a:p>
@@ -6312,7 +6797,7 @@
           <a:p>
             <a:fld id="{7A192637-BFDA-46FE-B306-083B272C9BF4}" type="datetimeFigureOut">
               <a:rPr lang="en-GB" smtClean="0"/>
-              <a:t>10/11/2021</a:t>
+              <a:t>14/11/2021</a:t>
             </a:fld>
             <a:endParaRPr lang="en-GB"/>
           </a:p>
@@ -6555,7 +7040,7 @@
           <a:p>
             <a:fld id="{7A192637-BFDA-46FE-B306-083B272C9BF4}" type="datetimeFigureOut">
               <a:rPr lang="en-GB" smtClean="0"/>
-              <a:t>10/11/2021</a:t>
+              <a:t>14/11/2021</a:t>
             </a:fld>
             <a:endParaRPr lang="en-GB"/>
           </a:p>
@@ -7038,6 +7523,15 @@
               <a:t>Jupyter Notebooks</a:t>
             </a:r>
           </a:p>
+          <a:p>
+            <a:endParaRPr lang="en-GB" dirty="0"/>
+          </a:p>
+          <a:p>
+            <a:r>
+              <a:rPr lang="en-GB" dirty="0"/>
+              <a:t>https://jupyter.readthedocs.io</a:t>
+            </a:r>
+          </a:p>
         </p:txBody>
       </p:sp>
     </p:spTree>
@@ -8248,6 +8742,1183 @@
 </p:sld>
 </file>
 
+<file path=ppt/slides/slide20.xml><?xml version="1.0" encoding="utf-8"?>
+<p:sld xmlns:a="http://schemas.openxmlformats.org/drawingml/2006/main" xmlns:r="http://schemas.openxmlformats.org/officeDocument/2006/relationships" xmlns:p="http://schemas.openxmlformats.org/presentationml/2006/main">
+  <p:cSld>
+    <p:spTree>
+      <p:nvGrpSpPr>
+        <p:cNvPr id="1" name=""/>
+        <p:cNvGrpSpPr/>
+        <p:nvPr/>
+      </p:nvGrpSpPr>
+      <p:grpSpPr>
+        <a:xfrm>
+          <a:off x="0" y="0"/>
+          <a:ext cx="0" cy="0"/>
+          <a:chOff x="0" y="0"/>
+          <a:chExt cx="0" cy="0"/>
+        </a:xfrm>
+      </p:grpSpPr>
+      <p:sp>
+        <p:nvSpPr>
+          <p:cNvPr id="2" name="Title 1">
+            <a:extLst>
+              <a:ext uri="{FF2B5EF4-FFF2-40B4-BE49-F238E27FC236}">
+                <a16:creationId xmlns:a16="http://schemas.microsoft.com/office/drawing/2014/main" id="{441EB75A-6CD7-49F8-8617-C1898F13FB96}"/>
+              </a:ext>
+            </a:extLst>
+          </p:cNvPr>
+          <p:cNvSpPr>
+            <a:spLocks noGrp="1"/>
+          </p:cNvSpPr>
+          <p:nvPr>
+            <p:ph type="title"/>
+          </p:nvPr>
+        </p:nvSpPr>
+        <p:spPr/>
+        <p:txBody>
+          <a:bodyPr/>
+          <a:lstStyle/>
+          <a:p>
+            <a:r>
+              <a:rPr lang="en-GB" dirty="0" err="1"/>
+              <a:t>MarkDown</a:t>
+            </a:r>
+            <a:endParaRPr lang="en-GB" dirty="0"/>
+          </a:p>
+        </p:txBody>
+      </p:sp>
+      <p:sp>
+        <p:nvSpPr>
+          <p:cNvPr id="3" name="Content Placeholder 2">
+            <a:extLst>
+              <a:ext uri="{FF2B5EF4-FFF2-40B4-BE49-F238E27FC236}">
+                <a16:creationId xmlns:a16="http://schemas.microsoft.com/office/drawing/2014/main" id="{EEB801AC-8839-4BE7-A095-06E857F29301}"/>
+              </a:ext>
+            </a:extLst>
+          </p:cNvPr>
+          <p:cNvSpPr>
+            <a:spLocks noGrp="1"/>
+          </p:cNvSpPr>
+          <p:nvPr>
+            <p:ph idx="1"/>
+          </p:nvPr>
+        </p:nvSpPr>
+        <p:spPr/>
+        <p:txBody>
+          <a:bodyPr/>
+          <a:lstStyle/>
+          <a:p>
+            <a:r>
+              <a:rPr lang="en-GB" dirty="0"/>
+              <a:t>Increasingly popular with software developers</a:t>
+            </a:r>
+          </a:p>
+          <a:p>
+            <a:r>
+              <a:rPr lang="en-GB" dirty="0"/>
+              <a:t>Simple  syntax</a:t>
+            </a:r>
+          </a:p>
+          <a:p>
+            <a:r>
+              <a:rPr lang="en-GB" dirty="0"/>
+              <a:t>Plain text so no special editor required</a:t>
+            </a:r>
+          </a:p>
+          <a:p>
+            <a:r>
+              <a:rPr lang="en-GB" dirty="0"/>
+              <a:t>Translated to HTML</a:t>
+            </a:r>
+          </a:p>
+          <a:p>
+            <a:pPr lvl="1"/>
+            <a:r>
+              <a:rPr lang="en-GB" dirty="0"/>
+              <a:t>Which means HTML can be included in </a:t>
+            </a:r>
+            <a:r>
+              <a:rPr lang="en-GB" dirty="0" err="1"/>
+              <a:t>MarkDown</a:t>
+            </a:r>
+            <a:endParaRPr lang="en-GB" dirty="0"/>
+          </a:p>
+          <a:p>
+            <a:pPr lvl="1"/>
+            <a:r>
+              <a:rPr lang="en-GB" dirty="0"/>
+              <a:t>Headings, lists, tables, code blocks, bold, italic, hyperlinks, …</a:t>
+            </a:r>
+          </a:p>
+          <a:p>
+            <a:r>
+              <a:rPr lang="en-GB" dirty="0"/>
+              <a:t>Integrated into Jupyter notebook </a:t>
+            </a:r>
+          </a:p>
+        </p:txBody>
+      </p:sp>
+    </p:spTree>
+    <p:extLst>
+      <p:ext uri="{BB962C8B-B14F-4D97-AF65-F5344CB8AC3E}">
+        <p14:creationId xmlns:p14="http://schemas.microsoft.com/office/powerpoint/2010/main" val="4111324460"/>
+      </p:ext>
+    </p:extLst>
+  </p:cSld>
+  <p:clrMapOvr>
+    <a:masterClrMapping/>
+  </p:clrMapOvr>
+</p:sld>
+</file>
+
+<file path=ppt/slides/slide21.xml><?xml version="1.0" encoding="utf-8"?>
+<p:sld xmlns:a="http://schemas.openxmlformats.org/drawingml/2006/main" xmlns:r="http://schemas.openxmlformats.org/officeDocument/2006/relationships" xmlns:p="http://schemas.openxmlformats.org/presentationml/2006/main">
+  <p:cSld>
+    <p:spTree>
+      <p:nvGrpSpPr>
+        <p:cNvPr id="1" name=""/>
+        <p:cNvGrpSpPr/>
+        <p:nvPr/>
+      </p:nvGrpSpPr>
+      <p:grpSpPr>
+        <a:xfrm>
+          <a:off x="0" y="0"/>
+          <a:ext cx="0" cy="0"/>
+          <a:chOff x="0" y="0"/>
+          <a:chExt cx="0" cy="0"/>
+        </a:xfrm>
+      </p:grpSpPr>
+      <p:sp>
+        <p:nvSpPr>
+          <p:cNvPr id="2" name="Title 1">
+            <a:extLst>
+              <a:ext uri="{FF2B5EF4-FFF2-40B4-BE49-F238E27FC236}">
+                <a16:creationId xmlns:a16="http://schemas.microsoft.com/office/drawing/2014/main" id="{C12AD9CD-64E9-4B97-A9D9-F0D2F4189989}"/>
+              </a:ext>
+            </a:extLst>
+          </p:cNvPr>
+          <p:cNvSpPr>
+            <a:spLocks noGrp="1"/>
+          </p:cNvSpPr>
+          <p:nvPr>
+            <p:ph type="title"/>
+          </p:nvPr>
+        </p:nvSpPr>
+        <p:spPr/>
+        <p:txBody>
+          <a:bodyPr/>
+          <a:lstStyle/>
+          <a:p>
+            <a:r>
+              <a:rPr lang="en-GB" dirty="0"/>
+              <a:t>Examples of Notebooks with Markdown</a:t>
+            </a:r>
+          </a:p>
+        </p:txBody>
+      </p:sp>
+      <p:sp>
+        <p:nvSpPr>
+          <p:cNvPr id="3" name="Content Placeholder 2">
+            <a:extLst>
+              <a:ext uri="{FF2B5EF4-FFF2-40B4-BE49-F238E27FC236}">
+                <a16:creationId xmlns:a16="http://schemas.microsoft.com/office/drawing/2014/main" id="{FDA42866-121C-44B8-8CF0-1D2E8F1BDF34}"/>
+              </a:ext>
+            </a:extLst>
+          </p:cNvPr>
+          <p:cNvSpPr>
+            <a:spLocks noGrp="1"/>
+          </p:cNvSpPr>
+          <p:nvPr>
+            <p:ph idx="1"/>
+          </p:nvPr>
+        </p:nvSpPr>
+        <p:spPr/>
+        <p:txBody>
+          <a:bodyPr/>
+          <a:lstStyle/>
+          <a:p>
+            <a:endParaRPr lang="en-GB" dirty="0"/>
+          </a:p>
+        </p:txBody>
+      </p:sp>
+    </p:spTree>
+    <p:extLst>
+      <p:ext uri="{BB962C8B-B14F-4D97-AF65-F5344CB8AC3E}">
+        <p14:creationId xmlns:p14="http://schemas.microsoft.com/office/powerpoint/2010/main" val="961299510"/>
+      </p:ext>
+    </p:extLst>
+  </p:cSld>
+  <p:clrMapOvr>
+    <a:masterClrMapping/>
+  </p:clrMapOvr>
+</p:sld>
+</file>
+
+<file path=ppt/slides/slide22.xml><?xml version="1.0" encoding="utf-8"?>
+<p:sld xmlns:a="http://schemas.openxmlformats.org/drawingml/2006/main" xmlns:r="http://schemas.openxmlformats.org/officeDocument/2006/relationships" xmlns:p="http://schemas.openxmlformats.org/presentationml/2006/main">
+  <p:cSld>
+    <p:spTree>
+      <p:nvGrpSpPr>
+        <p:cNvPr id="1" name=""/>
+        <p:cNvGrpSpPr/>
+        <p:nvPr/>
+      </p:nvGrpSpPr>
+      <p:grpSpPr>
+        <a:xfrm>
+          <a:off x="0" y="0"/>
+          <a:ext cx="0" cy="0"/>
+          <a:chOff x="0" y="0"/>
+          <a:chExt cx="0" cy="0"/>
+        </a:xfrm>
+      </p:grpSpPr>
+      <p:sp>
+        <p:nvSpPr>
+          <p:cNvPr id="2" name="Title 1">
+            <a:extLst>
+              <a:ext uri="{FF2B5EF4-FFF2-40B4-BE49-F238E27FC236}">
+                <a16:creationId xmlns:a16="http://schemas.microsoft.com/office/drawing/2014/main" id="{BED0E312-7C8F-4752-889E-18861DC53220}"/>
+              </a:ext>
+            </a:extLst>
+          </p:cNvPr>
+          <p:cNvSpPr>
+            <a:spLocks noGrp="1"/>
+          </p:cNvSpPr>
+          <p:nvPr>
+            <p:ph type="title"/>
+          </p:nvPr>
+        </p:nvSpPr>
+        <p:spPr/>
+        <p:txBody>
+          <a:bodyPr/>
+          <a:lstStyle/>
+          <a:p>
+            <a:r>
+              <a:rPr lang="en-GB" dirty="0"/>
+              <a:t>Assignments</a:t>
+            </a:r>
+          </a:p>
+        </p:txBody>
+      </p:sp>
+      <p:sp>
+        <p:nvSpPr>
+          <p:cNvPr id="3" name="Text Placeholder 2">
+            <a:extLst>
+              <a:ext uri="{FF2B5EF4-FFF2-40B4-BE49-F238E27FC236}">
+                <a16:creationId xmlns:a16="http://schemas.microsoft.com/office/drawing/2014/main" id="{00641CF9-0B86-4E07-99F7-25948BFC9E2F}"/>
+              </a:ext>
+            </a:extLst>
+          </p:cNvPr>
+          <p:cNvSpPr>
+            <a:spLocks noGrp="1"/>
+          </p:cNvSpPr>
+          <p:nvPr>
+            <p:ph type="body" idx="1"/>
+          </p:nvPr>
+        </p:nvSpPr>
+        <p:spPr/>
+        <p:txBody>
+          <a:bodyPr/>
+          <a:lstStyle/>
+          <a:p>
+            <a:r>
+              <a:rPr lang="en-GB" dirty="0"/>
+              <a:t>How you did on the last one</a:t>
+            </a:r>
+          </a:p>
+          <a:p>
+            <a:r>
+              <a:rPr lang="en-GB" dirty="0"/>
+              <a:t>The next two</a:t>
+            </a:r>
+          </a:p>
+        </p:txBody>
+      </p:sp>
+    </p:spTree>
+    <p:extLst>
+      <p:ext uri="{BB962C8B-B14F-4D97-AF65-F5344CB8AC3E}">
+        <p14:creationId xmlns:p14="http://schemas.microsoft.com/office/powerpoint/2010/main" val="3388677663"/>
+      </p:ext>
+    </p:extLst>
+  </p:cSld>
+  <p:clrMapOvr>
+    <a:masterClrMapping/>
+  </p:clrMapOvr>
+</p:sld>
+</file>
+
+<file path=ppt/slides/slide23.xml><?xml version="1.0" encoding="utf-8"?>
+<p:sld xmlns:a="http://schemas.openxmlformats.org/drawingml/2006/main" xmlns:r="http://schemas.openxmlformats.org/officeDocument/2006/relationships" xmlns:p="http://schemas.openxmlformats.org/presentationml/2006/main">
+  <p:cSld>
+    <p:spTree>
+      <p:nvGrpSpPr>
+        <p:cNvPr id="1" name=""/>
+        <p:cNvGrpSpPr/>
+        <p:nvPr/>
+      </p:nvGrpSpPr>
+      <p:grpSpPr>
+        <a:xfrm>
+          <a:off x="0" y="0"/>
+          <a:ext cx="0" cy="0"/>
+          <a:chOff x="0" y="0"/>
+          <a:chExt cx="0" cy="0"/>
+        </a:xfrm>
+      </p:grpSpPr>
+      <p:sp>
+        <p:nvSpPr>
+          <p:cNvPr id="2" name="Title 1">
+            <a:extLst>
+              <a:ext uri="{FF2B5EF4-FFF2-40B4-BE49-F238E27FC236}">
+                <a16:creationId xmlns:a16="http://schemas.microsoft.com/office/drawing/2014/main" id="{9B0EFFC5-828E-445D-8692-4FE74BFE9178}"/>
+              </a:ext>
+            </a:extLst>
+          </p:cNvPr>
+          <p:cNvSpPr>
+            <a:spLocks noGrp="1"/>
+          </p:cNvSpPr>
+          <p:nvPr>
+            <p:ph type="title"/>
+          </p:nvPr>
+        </p:nvSpPr>
+        <p:spPr/>
+        <p:txBody>
+          <a:bodyPr/>
+          <a:lstStyle/>
+          <a:p>
+            <a:r>
+              <a:rPr lang="en-GB" dirty="0"/>
+              <a:t>W6 Assignment Summary Feedback</a:t>
+            </a:r>
+          </a:p>
+        </p:txBody>
+      </p:sp>
+      <p:sp>
+        <p:nvSpPr>
+          <p:cNvPr id="3" name="Content Placeholder 2">
+            <a:extLst>
+              <a:ext uri="{FF2B5EF4-FFF2-40B4-BE49-F238E27FC236}">
+                <a16:creationId xmlns:a16="http://schemas.microsoft.com/office/drawing/2014/main" id="{621463C7-711D-4FF5-8A75-803AD83B76B9}"/>
+              </a:ext>
+            </a:extLst>
+          </p:cNvPr>
+          <p:cNvSpPr>
+            <a:spLocks noGrp="1"/>
+          </p:cNvSpPr>
+          <p:nvPr>
+            <p:ph idx="1"/>
+          </p:nvPr>
+        </p:nvSpPr>
+        <p:spPr/>
+        <p:txBody>
+          <a:bodyPr/>
+          <a:lstStyle/>
+          <a:p>
+            <a:endParaRPr lang="en-GB" dirty="0"/>
+          </a:p>
+        </p:txBody>
+      </p:sp>
+    </p:spTree>
+    <p:extLst>
+      <p:ext uri="{BB962C8B-B14F-4D97-AF65-F5344CB8AC3E}">
+        <p14:creationId xmlns:p14="http://schemas.microsoft.com/office/powerpoint/2010/main" val="1589586033"/>
+      </p:ext>
+    </p:extLst>
+  </p:cSld>
+  <p:clrMapOvr>
+    <a:masterClrMapping/>
+  </p:clrMapOvr>
+</p:sld>
+</file>
+
+<file path=ppt/slides/slide24.xml><?xml version="1.0" encoding="utf-8"?>
+<p:sld xmlns:a="http://schemas.openxmlformats.org/drawingml/2006/main" xmlns:r="http://schemas.openxmlformats.org/officeDocument/2006/relationships" xmlns:p="http://schemas.openxmlformats.org/presentationml/2006/main">
+  <p:cSld>
+    <p:spTree>
+      <p:nvGrpSpPr>
+        <p:cNvPr id="1" name=""/>
+        <p:cNvGrpSpPr/>
+        <p:nvPr/>
+      </p:nvGrpSpPr>
+      <p:grpSpPr>
+        <a:xfrm>
+          <a:off x="0" y="0"/>
+          <a:ext cx="0" cy="0"/>
+          <a:chOff x="0" y="0"/>
+          <a:chExt cx="0" cy="0"/>
+        </a:xfrm>
+      </p:grpSpPr>
+      <p:sp>
+        <p:nvSpPr>
+          <p:cNvPr id="2" name="Title 1">
+            <a:extLst>
+              <a:ext uri="{FF2B5EF4-FFF2-40B4-BE49-F238E27FC236}">
+                <a16:creationId xmlns:a16="http://schemas.microsoft.com/office/drawing/2014/main" id="{474C5F92-1942-4258-ACE7-04A01D1BF67D}"/>
+              </a:ext>
+            </a:extLst>
+          </p:cNvPr>
+          <p:cNvSpPr>
+            <a:spLocks noGrp="1"/>
+          </p:cNvSpPr>
+          <p:nvPr>
+            <p:ph type="title"/>
+          </p:nvPr>
+        </p:nvSpPr>
+        <p:spPr/>
+        <p:txBody>
+          <a:bodyPr/>
+          <a:lstStyle/>
+          <a:p>
+            <a:r>
+              <a:rPr lang="en-GB" dirty="0"/>
+              <a:t>Final 2 Assignments</a:t>
+            </a:r>
+          </a:p>
+        </p:txBody>
+      </p:sp>
+      <p:sp>
+        <p:nvSpPr>
+          <p:cNvPr id="3" name="Text Placeholder 2">
+            <a:extLst>
+              <a:ext uri="{FF2B5EF4-FFF2-40B4-BE49-F238E27FC236}">
+                <a16:creationId xmlns:a16="http://schemas.microsoft.com/office/drawing/2014/main" id="{9F0F1AD1-7D37-4508-B4F6-4DBC8730BDE2}"/>
+              </a:ext>
+            </a:extLst>
+          </p:cNvPr>
+          <p:cNvSpPr>
+            <a:spLocks noGrp="1"/>
+          </p:cNvSpPr>
+          <p:nvPr>
+            <p:ph type="body" idx="1"/>
+          </p:nvPr>
+        </p:nvSpPr>
+        <p:spPr/>
+        <p:txBody>
+          <a:bodyPr/>
+          <a:lstStyle/>
+          <a:p>
+            <a:r>
+              <a:rPr lang="en-GB" dirty="0"/>
+              <a:t>Is a single assignment in two parts</a:t>
+            </a:r>
+          </a:p>
+        </p:txBody>
+      </p:sp>
+    </p:spTree>
+    <p:extLst>
+      <p:ext uri="{BB962C8B-B14F-4D97-AF65-F5344CB8AC3E}">
+        <p14:creationId xmlns:p14="http://schemas.microsoft.com/office/powerpoint/2010/main" val="3760159532"/>
+      </p:ext>
+    </p:extLst>
+  </p:cSld>
+  <p:clrMapOvr>
+    <a:masterClrMapping/>
+  </p:clrMapOvr>
+</p:sld>
+</file>
+
+<file path=ppt/slides/slide25.xml><?xml version="1.0" encoding="utf-8"?>
+<p:sld xmlns:a="http://schemas.openxmlformats.org/drawingml/2006/main" xmlns:r="http://schemas.openxmlformats.org/officeDocument/2006/relationships" xmlns:p="http://schemas.openxmlformats.org/presentationml/2006/main">
+  <p:cSld>
+    <p:spTree>
+      <p:nvGrpSpPr>
+        <p:cNvPr id="1" name=""/>
+        <p:cNvGrpSpPr/>
+        <p:nvPr/>
+      </p:nvGrpSpPr>
+      <p:grpSpPr>
+        <a:xfrm>
+          <a:off x="0" y="0"/>
+          <a:ext cx="0" cy="0"/>
+          <a:chOff x="0" y="0"/>
+          <a:chExt cx="0" cy="0"/>
+        </a:xfrm>
+      </p:grpSpPr>
+      <p:sp>
+        <p:nvSpPr>
+          <p:cNvPr id="2" name="Title 1">
+            <a:extLst>
+              <a:ext uri="{FF2B5EF4-FFF2-40B4-BE49-F238E27FC236}">
+                <a16:creationId xmlns:a16="http://schemas.microsoft.com/office/drawing/2014/main" id="{3B8B7557-8E1B-4C5B-AAE2-BA8BF82D6010}"/>
+              </a:ext>
+            </a:extLst>
+          </p:cNvPr>
+          <p:cNvSpPr>
+            <a:spLocks noGrp="1"/>
+          </p:cNvSpPr>
+          <p:nvPr>
+            <p:ph type="title"/>
+          </p:nvPr>
+        </p:nvSpPr>
+        <p:spPr/>
+        <p:txBody>
+          <a:bodyPr>
+            <a:normAutofit/>
+          </a:bodyPr>
+          <a:lstStyle/>
+          <a:p>
+            <a:r>
+              <a:rPr lang="en-GB" dirty="0"/>
+              <a:t>The final two assignments are a software </a:t>
+            </a:r>
+            <a:r>
+              <a:rPr lang="en-GB"/>
+              <a:t>development project</a:t>
+            </a:r>
+            <a:endParaRPr lang="en-GB" dirty="0"/>
+          </a:p>
+        </p:txBody>
+      </p:sp>
+      <p:sp>
+        <p:nvSpPr>
+          <p:cNvPr id="3" name="Content Placeholder 2">
+            <a:extLst>
+              <a:ext uri="{FF2B5EF4-FFF2-40B4-BE49-F238E27FC236}">
+                <a16:creationId xmlns:a16="http://schemas.microsoft.com/office/drawing/2014/main" id="{DDA0DD76-F54F-45A1-BE97-63EC9AE2A66A}"/>
+              </a:ext>
+            </a:extLst>
+          </p:cNvPr>
+          <p:cNvSpPr>
+            <a:spLocks noGrp="1"/>
+          </p:cNvSpPr>
+          <p:nvPr>
+            <p:ph idx="1"/>
+          </p:nvPr>
+        </p:nvSpPr>
+        <p:spPr/>
+        <p:txBody>
+          <a:bodyPr/>
+          <a:lstStyle/>
+          <a:p>
+            <a:r>
+              <a:rPr lang="en-GB" dirty="0"/>
+              <a:t>Part 1</a:t>
+            </a:r>
+          </a:p>
+          <a:p>
+            <a:pPr lvl="1"/>
+            <a:r>
+              <a:rPr lang="en-GB" dirty="0"/>
+              <a:t>A software project development proposal describing the ideas and objectives you  intend to explore and an outline of the software you will build</a:t>
+            </a:r>
+          </a:p>
+          <a:p>
+            <a:r>
+              <a:rPr lang="en-GB" dirty="0"/>
+              <a:t>Part 2</a:t>
+            </a:r>
+          </a:p>
+          <a:p>
+            <a:pPr lvl="1"/>
+            <a:r>
+              <a:rPr lang="en-GB" dirty="0"/>
+              <a:t>A development diary describing your work on the product; the analysis, the designs, the false starts, the stuff that didn’t work, the stuff that did work, the testing, the changes of direction, and hopefully, the bits that did work</a:t>
+            </a:r>
+          </a:p>
+          <a:p>
+            <a:pPr lvl="1"/>
+            <a:r>
+              <a:rPr lang="en-GB" dirty="0"/>
+              <a:t>The software system you built (regardless of whether it fully works or not!). The code, the data files, the test evidence, and so on</a:t>
+            </a:r>
+          </a:p>
+          <a:p>
+            <a:r>
+              <a:rPr lang="en-GB" dirty="0"/>
+              <a:t>Deadlines: Part 1 in 2 weeks. Part 2 by 7 January.</a:t>
+            </a:r>
+          </a:p>
+        </p:txBody>
+      </p:sp>
+    </p:spTree>
+    <p:extLst>
+      <p:ext uri="{BB962C8B-B14F-4D97-AF65-F5344CB8AC3E}">
+        <p14:creationId xmlns:p14="http://schemas.microsoft.com/office/powerpoint/2010/main" val="2562719481"/>
+      </p:ext>
+    </p:extLst>
+  </p:cSld>
+  <p:clrMapOvr>
+    <a:masterClrMapping/>
+  </p:clrMapOvr>
+</p:sld>
+</file>
+
+<file path=ppt/slides/slide26.xml><?xml version="1.0" encoding="utf-8"?>
+<p:sld xmlns:a="http://schemas.openxmlformats.org/drawingml/2006/main" xmlns:r="http://schemas.openxmlformats.org/officeDocument/2006/relationships" xmlns:p="http://schemas.openxmlformats.org/presentationml/2006/main">
+  <p:cSld>
+    <p:spTree>
+      <p:nvGrpSpPr>
+        <p:cNvPr id="1" name=""/>
+        <p:cNvGrpSpPr/>
+        <p:nvPr/>
+      </p:nvGrpSpPr>
+      <p:grpSpPr>
+        <a:xfrm>
+          <a:off x="0" y="0"/>
+          <a:ext cx="0" cy="0"/>
+          <a:chOff x="0" y="0"/>
+          <a:chExt cx="0" cy="0"/>
+        </a:xfrm>
+      </p:grpSpPr>
+      <p:sp>
+        <p:nvSpPr>
+          <p:cNvPr id="2" name="Title 1">
+            <a:extLst>
+              <a:ext uri="{FF2B5EF4-FFF2-40B4-BE49-F238E27FC236}">
+                <a16:creationId xmlns:a16="http://schemas.microsoft.com/office/drawing/2014/main" id="{3B8B7557-8E1B-4C5B-AAE2-BA8BF82D6010}"/>
+              </a:ext>
+            </a:extLst>
+          </p:cNvPr>
+          <p:cNvSpPr>
+            <a:spLocks noGrp="1"/>
+          </p:cNvSpPr>
+          <p:nvPr>
+            <p:ph type="title"/>
+          </p:nvPr>
+        </p:nvSpPr>
+        <p:spPr/>
+        <p:txBody>
+          <a:bodyPr>
+            <a:normAutofit/>
+          </a:bodyPr>
+          <a:lstStyle/>
+          <a:p>
+            <a:r>
+              <a:rPr lang="en-GB" dirty="0"/>
+              <a:t>Final Assignment part one = Definition</a:t>
+            </a:r>
+            <a:br>
+              <a:rPr lang="en-GB" dirty="0"/>
+            </a:br>
+            <a:r>
+              <a:rPr lang="en-GB" dirty="0"/>
+              <a:t>Assignment:</a:t>
+            </a:r>
+          </a:p>
+        </p:txBody>
+      </p:sp>
+      <p:sp>
+        <p:nvSpPr>
+          <p:cNvPr id="3" name="Content Placeholder 2">
+            <a:extLst>
+              <a:ext uri="{FF2B5EF4-FFF2-40B4-BE49-F238E27FC236}">
+                <a16:creationId xmlns:a16="http://schemas.microsoft.com/office/drawing/2014/main" id="{DDA0DD76-F54F-45A1-BE97-63EC9AE2A66A}"/>
+              </a:ext>
+            </a:extLst>
+          </p:cNvPr>
+          <p:cNvSpPr>
+            <a:spLocks noGrp="1"/>
+          </p:cNvSpPr>
+          <p:nvPr>
+            <p:ph idx="1"/>
+          </p:nvPr>
+        </p:nvSpPr>
+        <p:spPr/>
+        <p:txBody>
+          <a:bodyPr>
+            <a:normAutofit/>
+          </a:bodyPr>
+          <a:lstStyle/>
+          <a:p>
+            <a:r>
+              <a:rPr lang="en-GB" dirty="0"/>
+              <a:t>Briefly describe the project objectives; the question(s) you intend to explore, your scope, and the intended deliverables</a:t>
+            </a:r>
+          </a:p>
+          <a:p>
+            <a:r>
+              <a:rPr lang="en-GB" dirty="0"/>
+              <a:t>If you need data, where will you source it from?</a:t>
+            </a:r>
+          </a:p>
+          <a:p>
+            <a:r>
+              <a:rPr lang="en-GB" dirty="0"/>
+              <a:t>A outline description of the software components you will build and how they will work together to deliver the project objectives</a:t>
+            </a:r>
+          </a:p>
+          <a:p>
+            <a:r>
+              <a:rPr lang="en-GB" dirty="0"/>
+              <a:t>A simple project plan</a:t>
+            </a:r>
+          </a:p>
+          <a:p>
+            <a:r>
+              <a:rPr lang="en-GB" dirty="0"/>
+              <a:t>Submit your proposal to me for marking and advice</a:t>
+            </a:r>
+          </a:p>
+          <a:p>
+            <a:endParaRPr lang="en-GB" dirty="0"/>
+          </a:p>
+          <a:p>
+            <a:r>
+              <a:rPr lang="en-GB" dirty="0"/>
+              <a:t>About 500 words or a couple of sides of A4 including lists &amp; sketches</a:t>
+            </a:r>
+          </a:p>
+        </p:txBody>
+      </p:sp>
+    </p:spTree>
+    <p:extLst>
+      <p:ext uri="{BB962C8B-B14F-4D97-AF65-F5344CB8AC3E}">
+        <p14:creationId xmlns:p14="http://schemas.microsoft.com/office/powerpoint/2010/main" val="3322056478"/>
+      </p:ext>
+    </p:extLst>
+  </p:cSld>
+  <p:clrMapOvr>
+    <a:masterClrMapping/>
+  </p:clrMapOvr>
+</p:sld>
+</file>
+
+<file path=ppt/slides/slide27.xml><?xml version="1.0" encoding="utf-8"?>
+<p:sld xmlns:a="http://schemas.openxmlformats.org/drawingml/2006/main" xmlns:r="http://schemas.openxmlformats.org/officeDocument/2006/relationships" xmlns:p="http://schemas.openxmlformats.org/presentationml/2006/main">
+  <p:cSld>
+    <p:spTree>
+      <p:nvGrpSpPr>
+        <p:cNvPr id="1" name=""/>
+        <p:cNvGrpSpPr/>
+        <p:nvPr/>
+      </p:nvGrpSpPr>
+      <p:grpSpPr>
+        <a:xfrm>
+          <a:off x="0" y="0"/>
+          <a:ext cx="0" cy="0"/>
+          <a:chOff x="0" y="0"/>
+          <a:chExt cx="0" cy="0"/>
+        </a:xfrm>
+      </p:grpSpPr>
+      <p:sp>
+        <p:nvSpPr>
+          <p:cNvPr id="2" name="Title 1">
+            <a:extLst>
+              <a:ext uri="{FF2B5EF4-FFF2-40B4-BE49-F238E27FC236}">
+                <a16:creationId xmlns:a16="http://schemas.microsoft.com/office/drawing/2014/main" id="{3B8B7557-8E1B-4C5B-AAE2-BA8BF82D6010}"/>
+              </a:ext>
+            </a:extLst>
+          </p:cNvPr>
+          <p:cNvSpPr>
+            <a:spLocks noGrp="1"/>
+          </p:cNvSpPr>
+          <p:nvPr>
+            <p:ph type="title"/>
+          </p:nvPr>
+        </p:nvSpPr>
+        <p:spPr/>
+        <p:txBody>
+          <a:bodyPr/>
+          <a:lstStyle/>
+          <a:p>
+            <a:r>
+              <a:rPr lang="en-GB" dirty="0"/>
+              <a:t>Final Assignment part one = Definition</a:t>
+            </a:r>
+            <a:br>
+              <a:rPr lang="en-GB" dirty="0"/>
+            </a:br>
+            <a:r>
+              <a:rPr lang="en-GB" dirty="0"/>
+              <a:t>Marking and feedback</a:t>
+            </a:r>
+          </a:p>
+        </p:txBody>
+      </p:sp>
+      <p:sp>
+        <p:nvSpPr>
+          <p:cNvPr id="3" name="Content Placeholder 2">
+            <a:extLst>
+              <a:ext uri="{FF2B5EF4-FFF2-40B4-BE49-F238E27FC236}">
+                <a16:creationId xmlns:a16="http://schemas.microsoft.com/office/drawing/2014/main" id="{DDA0DD76-F54F-45A1-BE97-63EC9AE2A66A}"/>
+              </a:ext>
+            </a:extLst>
+          </p:cNvPr>
+          <p:cNvSpPr>
+            <a:spLocks noGrp="1"/>
+          </p:cNvSpPr>
+          <p:nvPr>
+            <p:ph idx="1"/>
+          </p:nvPr>
+        </p:nvSpPr>
+        <p:spPr/>
+        <p:txBody>
+          <a:bodyPr>
+            <a:normAutofit/>
+          </a:bodyPr>
+          <a:lstStyle/>
+          <a:p>
+            <a:r>
+              <a:rPr lang="en-GB" dirty="0"/>
+              <a:t>Your assignment will be judged and marked as a </a:t>
+            </a:r>
+            <a:r>
+              <a:rPr lang="en-GB" b="1" dirty="0"/>
+              <a:t>software development project</a:t>
+            </a:r>
+            <a:endParaRPr lang="en-GB" dirty="0"/>
+          </a:p>
+          <a:p>
+            <a:r>
+              <a:rPr lang="en-GB" dirty="0"/>
+              <a:t>It will </a:t>
+            </a:r>
+            <a:r>
+              <a:rPr lang="en-GB" b="1" dirty="0"/>
+              <a:t>not</a:t>
+            </a:r>
+            <a:r>
+              <a:rPr lang="en-GB" dirty="0"/>
+              <a:t> be judged on the linguistic concepts you propose to investigate</a:t>
+            </a:r>
+          </a:p>
+          <a:p>
+            <a:r>
+              <a:rPr lang="en-GB" dirty="0"/>
+              <a:t>My feedback will be in one of three categories</a:t>
+            </a:r>
+          </a:p>
+          <a:p>
+            <a:pPr marL="914400" lvl="1" indent="-457200">
+              <a:buFont typeface="+mj-lt"/>
+              <a:buAutoNum type="arabicPeriod"/>
+            </a:pPr>
+            <a:r>
+              <a:rPr lang="en-GB" dirty="0"/>
+              <a:t>Too ambitious, reduce your scope</a:t>
+            </a:r>
+          </a:p>
+          <a:p>
+            <a:pPr marL="914400" lvl="1" indent="-457200">
+              <a:buFont typeface="+mj-lt"/>
+              <a:buAutoNum type="arabicPeriod"/>
+            </a:pPr>
+            <a:r>
+              <a:rPr lang="en-GB" dirty="0"/>
+              <a:t>About right</a:t>
+            </a:r>
+          </a:p>
+          <a:p>
+            <a:pPr marL="914400" lvl="1" indent="-457200">
+              <a:buFont typeface="+mj-lt"/>
+              <a:buAutoNum type="arabicPeriod"/>
+            </a:pPr>
+            <a:r>
+              <a:rPr lang="en-GB" dirty="0"/>
+              <a:t>Too modest, increase your scope</a:t>
+            </a:r>
+          </a:p>
+          <a:p>
+            <a:pPr lvl="1"/>
+            <a:endParaRPr lang="en-GB" dirty="0"/>
+          </a:p>
+        </p:txBody>
+      </p:sp>
+    </p:spTree>
+    <p:extLst>
+      <p:ext uri="{BB962C8B-B14F-4D97-AF65-F5344CB8AC3E}">
+        <p14:creationId xmlns:p14="http://schemas.microsoft.com/office/powerpoint/2010/main" val="3947401188"/>
+      </p:ext>
+    </p:extLst>
+  </p:cSld>
+  <p:clrMapOvr>
+    <a:masterClrMapping/>
+  </p:clrMapOvr>
+</p:sld>
+</file>
+
+<file path=ppt/slides/slide28.xml><?xml version="1.0" encoding="utf-8"?>
+<p:sld xmlns:a="http://schemas.openxmlformats.org/drawingml/2006/main" xmlns:r="http://schemas.openxmlformats.org/officeDocument/2006/relationships" xmlns:p="http://schemas.openxmlformats.org/presentationml/2006/main">
+  <p:cSld>
+    <p:spTree>
+      <p:nvGrpSpPr>
+        <p:cNvPr id="1" name=""/>
+        <p:cNvGrpSpPr/>
+        <p:nvPr/>
+      </p:nvGrpSpPr>
+      <p:grpSpPr>
+        <a:xfrm>
+          <a:off x="0" y="0"/>
+          <a:ext cx="0" cy="0"/>
+          <a:chOff x="0" y="0"/>
+          <a:chExt cx="0" cy="0"/>
+        </a:xfrm>
+      </p:grpSpPr>
+      <p:sp>
+        <p:nvSpPr>
+          <p:cNvPr id="2" name="Title 1">
+            <a:extLst>
+              <a:ext uri="{FF2B5EF4-FFF2-40B4-BE49-F238E27FC236}">
+                <a16:creationId xmlns:a16="http://schemas.microsoft.com/office/drawing/2014/main" id="{3B8B7557-8E1B-4C5B-AAE2-BA8BF82D6010}"/>
+              </a:ext>
+            </a:extLst>
+          </p:cNvPr>
+          <p:cNvSpPr>
+            <a:spLocks noGrp="1"/>
+          </p:cNvSpPr>
+          <p:nvPr>
+            <p:ph type="title"/>
+          </p:nvPr>
+        </p:nvSpPr>
+        <p:spPr/>
+        <p:txBody>
+          <a:bodyPr>
+            <a:normAutofit/>
+          </a:bodyPr>
+          <a:lstStyle/>
+          <a:p>
+            <a:r>
+              <a:rPr lang="en-GB" dirty="0"/>
+              <a:t>Final Assignment part two</a:t>
+            </a:r>
+            <a:br>
+              <a:rPr lang="en-GB" dirty="0"/>
+            </a:br>
+            <a:r>
+              <a:rPr lang="en-GB" dirty="0"/>
+              <a:t>Report – section A</a:t>
+            </a:r>
+          </a:p>
+        </p:txBody>
+      </p:sp>
+      <p:sp>
+        <p:nvSpPr>
+          <p:cNvPr id="3" name="Content Placeholder 2">
+            <a:extLst>
+              <a:ext uri="{FF2B5EF4-FFF2-40B4-BE49-F238E27FC236}">
+                <a16:creationId xmlns:a16="http://schemas.microsoft.com/office/drawing/2014/main" id="{DDA0DD76-F54F-45A1-BE97-63EC9AE2A66A}"/>
+              </a:ext>
+            </a:extLst>
+          </p:cNvPr>
+          <p:cNvSpPr>
+            <a:spLocks noGrp="1"/>
+          </p:cNvSpPr>
+          <p:nvPr>
+            <p:ph idx="1"/>
+          </p:nvPr>
+        </p:nvSpPr>
+        <p:spPr/>
+        <p:txBody>
+          <a:bodyPr>
+            <a:normAutofit lnSpcReduction="10000"/>
+          </a:bodyPr>
+          <a:lstStyle/>
+          <a:p>
+            <a:r>
+              <a:rPr lang="en-GB" dirty="0"/>
+              <a:t>The project objective</a:t>
+            </a:r>
+          </a:p>
+          <a:p>
+            <a:pPr lvl="1"/>
+            <a:r>
+              <a:rPr lang="en-GB" dirty="0"/>
+              <a:t>The question(s) you intended to explore, and the intended deliverables</a:t>
+            </a:r>
+          </a:p>
+          <a:p>
+            <a:r>
+              <a:rPr lang="en-GB" dirty="0"/>
+              <a:t>Data</a:t>
+            </a:r>
+          </a:p>
+          <a:p>
+            <a:pPr lvl="1"/>
+            <a:r>
+              <a:rPr lang="en-GB" dirty="0"/>
+              <a:t>Where you got your data</a:t>
+            </a:r>
+          </a:p>
+          <a:p>
+            <a:pPr lvl="1"/>
+            <a:r>
+              <a:rPr lang="en-GB" dirty="0"/>
+              <a:t>How you decided it was useful/representative</a:t>
+            </a:r>
+          </a:p>
+          <a:p>
+            <a:r>
+              <a:rPr lang="en-GB" dirty="0"/>
+              <a:t>An analysis of the problem into its component parts</a:t>
+            </a:r>
+          </a:p>
+          <a:p>
+            <a:r>
+              <a:rPr lang="en-GB" dirty="0"/>
+              <a:t>The design of the software components to be built and how they will work together to deliver the project objectives</a:t>
+            </a:r>
+          </a:p>
+          <a:p>
+            <a:r>
+              <a:rPr lang="en-GB" dirty="0"/>
+              <a:t>How the software was tested (or was intended to be tested!) </a:t>
+            </a:r>
+          </a:p>
+          <a:p>
+            <a:r>
+              <a:rPr lang="en-GB" dirty="0"/>
+              <a:t>About 2000 words of prose / tables / lists / documentation</a:t>
+            </a:r>
+          </a:p>
+        </p:txBody>
+      </p:sp>
+    </p:spTree>
+    <p:extLst>
+      <p:ext uri="{BB962C8B-B14F-4D97-AF65-F5344CB8AC3E}">
+        <p14:creationId xmlns:p14="http://schemas.microsoft.com/office/powerpoint/2010/main" val="3458306016"/>
+      </p:ext>
+    </p:extLst>
+  </p:cSld>
+  <p:clrMapOvr>
+    <a:masterClrMapping/>
+  </p:clrMapOvr>
+</p:sld>
+</file>
+
+<file path=ppt/slides/slide29.xml><?xml version="1.0" encoding="utf-8"?>
+<p:sld xmlns:a="http://schemas.openxmlformats.org/drawingml/2006/main" xmlns:r="http://schemas.openxmlformats.org/officeDocument/2006/relationships" xmlns:p="http://schemas.openxmlformats.org/presentationml/2006/main">
+  <p:cSld>
+    <p:spTree>
+      <p:nvGrpSpPr>
+        <p:cNvPr id="1" name=""/>
+        <p:cNvGrpSpPr/>
+        <p:nvPr/>
+      </p:nvGrpSpPr>
+      <p:grpSpPr>
+        <a:xfrm>
+          <a:off x="0" y="0"/>
+          <a:ext cx="0" cy="0"/>
+          <a:chOff x="0" y="0"/>
+          <a:chExt cx="0" cy="0"/>
+        </a:xfrm>
+      </p:grpSpPr>
+      <p:sp>
+        <p:nvSpPr>
+          <p:cNvPr id="2" name="Title 1">
+            <a:extLst>
+              <a:ext uri="{FF2B5EF4-FFF2-40B4-BE49-F238E27FC236}">
+                <a16:creationId xmlns:a16="http://schemas.microsoft.com/office/drawing/2014/main" id="{3B8B7557-8E1B-4C5B-AAE2-BA8BF82D6010}"/>
+              </a:ext>
+            </a:extLst>
+          </p:cNvPr>
+          <p:cNvSpPr>
+            <a:spLocks noGrp="1"/>
+          </p:cNvSpPr>
+          <p:nvPr>
+            <p:ph type="title"/>
+          </p:nvPr>
+        </p:nvSpPr>
+        <p:spPr/>
+        <p:txBody>
+          <a:bodyPr>
+            <a:normAutofit/>
+          </a:bodyPr>
+          <a:lstStyle/>
+          <a:p>
+            <a:r>
+              <a:rPr lang="en-GB" dirty="0"/>
+              <a:t>Final Assignment part two</a:t>
+            </a:r>
+            <a:br>
+              <a:rPr lang="en-GB" dirty="0"/>
+            </a:br>
+            <a:r>
+              <a:rPr lang="en-GB" dirty="0"/>
+              <a:t>Report – Section B</a:t>
+            </a:r>
+          </a:p>
+        </p:txBody>
+      </p:sp>
+      <p:sp>
+        <p:nvSpPr>
+          <p:cNvPr id="3" name="Content Placeholder 2">
+            <a:extLst>
+              <a:ext uri="{FF2B5EF4-FFF2-40B4-BE49-F238E27FC236}">
+                <a16:creationId xmlns:a16="http://schemas.microsoft.com/office/drawing/2014/main" id="{DDA0DD76-F54F-45A1-BE97-63EC9AE2A66A}"/>
+              </a:ext>
+            </a:extLst>
+          </p:cNvPr>
+          <p:cNvSpPr>
+            <a:spLocks noGrp="1"/>
+          </p:cNvSpPr>
+          <p:nvPr>
+            <p:ph idx="1"/>
+          </p:nvPr>
+        </p:nvSpPr>
+        <p:spPr/>
+        <p:txBody>
+          <a:bodyPr>
+            <a:normAutofit/>
+          </a:bodyPr>
+          <a:lstStyle/>
+          <a:p>
+            <a:r>
+              <a:rPr lang="en-GB" dirty="0"/>
+              <a:t>Your project diary</a:t>
+            </a:r>
+          </a:p>
+          <a:p>
+            <a:r>
+              <a:rPr lang="en-GB" dirty="0"/>
+              <a:t>The approximate equivalent of a laboratory scientists ‘lab notebook’</a:t>
+            </a:r>
+          </a:p>
+          <a:p>
+            <a:pPr lvl="1"/>
+            <a:r>
+              <a:rPr lang="en-GB" dirty="0"/>
+              <a:t>Doing ‘experiment 27’ is the equivalent of ‘build function 27’</a:t>
+            </a:r>
+          </a:p>
+          <a:p>
+            <a:pPr lvl="1"/>
+            <a:r>
+              <a:rPr lang="en-GB" dirty="0"/>
+              <a:t>Describe each experiment/function before it is done and how your code achieves that aim</a:t>
+            </a:r>
+          </a:p>
+          <a:p>
+            <a:pPr lvl="1"/>
+            <a:r>
+              <a:rPr lang="en-GB" dirty="0"/>
+              <a:t>Do it. Making notes of any ‘fixes’ or ‘corrections’ applied, or problems spotted along the way</a:t>
+            </a:r>
+          </a:p>
+          <a:p>
+            <a:pPr lvl="1"/>
+            <a:r>
+              <a:rPr lang="en-GB" dirty="0"/>
+              <a:t>Record end result and testing. Did it work? How well ? </a:t>
+            </a:r>
+          </a:p>
+          <a:p>
+            <a:pPr lvl="1"/>
+            <a:r>
+              <a:rPr lang="en-GB" dirty="0"/>
+              <a:t>Review: Good enough? Thoughts on how to do it better?</a:t>
+            </a:r>
+          </a:p>
+          <a:p>
+            <a:pPr lvl="1"/>
+            <a:r>
+              <a:rPr lang="en-GB" dirty="0"/>
+              <a:t>Move on to next experiment / software component</a:t>
+            </a:r>
+          </a:p>
+        </p:txBody>
+      </p:sp>
+    </p:spTree>
+    <p:extLst>
+      <p:ext uri="{BB962C8B-B14F-4D97-AF65-F5344CB8AC3E}">
+        <p14:creationId xmlns:p14="http://schemas.microsoft.com/office/powerpoint/2010/main" val="2075561499"/>
+      </p:ext>
+    </p:extLst>
+  </p:cSld>
+  <p:clrMapOvr>
+    <a:masterClrMapping/>
+  </p:clrMapOvr>
+</p:sld>
+</file>
+
 <file path=ppt/slides/slide3.xml><?xml version="1.0" encoding="utf-8"?>
 <p:sld xmlns:a="http://schemas.openxmlformats.org/drawingml/2006/main" xmlns:r="http://schemas.openxmlformats.org/officeDocument/2006/relationships" xmlns:p="http://schemas.openxmlformats.org/presentationml/2006/main">
   <p:cSld>
@@ -8396,6 +10067,939 @@
       <p:transition spd="slow" advTm="10000"/>
     </mc:Fallback>
   </mc:AlternateContent>
+</p:sld>
+</file>
+
+<file path=ppt/slides/slide30.xml><?xml version="1.0" encoding="utf-8"?>
+<p:sld xmlns:a="http://schemas.openxmlformats.org/drawingml/2006/main" xmlns:r="http://schemas.openxmlformats.org/officeDocument/2006/relationships" xmlns:p="http://schemas.openxmlformats.org/presentationml/2006/main">
+  <p:cSld>
+    <p:spTree>
+      <p:nvGrpSpPr>
+        <p:cNvPr id="1" name=""/>
+        <p:cNvGrpSpPr/>
+        <p:nvPr/>
+      </p:nvGrpSpPr>
+      <p:grpSpPr>
+        <a:xfrm>
+          <a:off x="0" y="0"/>
+          <a:ext cx="0" cy="0"/>
+          <a:chOff x="0" y="0"/>
+          <a:chExt cx="0" cy="0"/>
+        </a:xfrm>
+      </p:grpSpPr>
+      <p:sp>
+        <p:nvSpPr>
+          <p:cNvPr id="2" name="Title 1">
+            <a:extLst>
+              <a:ext uri="{FF2B5EF4-FFF2-40B4-BE49-F238E27FC236}">
+                <a16:creationId xmlns:a16="http://schemas.microsoft.com/office/drawing/2014/main" id="{3B8B7557-8E1B-4C5B-AAE2-BA8BF82D6010}"/>
+              </a:ext>
+            </a:extLst>
+          </p:cNvPr>
+          <p:cNvSpPr>
+            <a:spLocks noGrp="1"/>
+          </p:cNvSpPr>
+          <p:nvPr>
+            <p:ph type="title"/>
+          </p:nvPr>
+        </p:nvSpPr>
+        <p:spPr/>
+        <p:txBody>
+          <a:bodyPr>
+            <a:normAutofit/>
+          </a:bodyPr>
+          <a:lstStyle/>
+          <a:p>
+            <a:r>
+              <a:rPr lang="en-GB" dirty="0"/>
+              <a:t>Final Assignment part two</a:t>
+            </a:r>
+            <a:br>
+              <a:rPr lang="en-GB" dirty="0"/>
+            </a:br>
+            <a:r>
+              <a:rPr lang="en-GB" dirty="0"/>
+              <a:t>Report – Section C</a:t>
+            </a:r>
+          </a:p>
+        </p:txBody>
+      </p:sp>
+      <p:sp>
+        <p:nvSpPr>
+          <p:cNvPr id="3" name="Content Placeholder 2">
+            <a:extLst>
+              <a:ext uri="{FF2B5EF4-FFF2-40B4-BE49-F238E27FC236}">
+                <a16:creationId xmlns:a16="http://schemas.microsoft.com/office/drawing/2014/main" id="{DDA0DD76-F54F-45A1-BE97-63EC9AE2A66A}"/>
+              </a:ext>
+            </a:extLst>
+          </p:cNvPr>
+          <p:cNvSpPr>
+            <a:spLocks noGrp="1"/>
+          </p:cNvSpPr>
+          <p:nvPr>
+            <p:ph idx="1"/>
+          </p:nvPr>
+        </p:nvSpPr>
+        <p:spPr/>
+        <p:txBody>
+          <a:bodyPr>
+            <a:normAutofit/>
+          </a:bodyPr>
+          <a:lstStyle/>
+          <a:p>
+            <a:r>
+              <a:rPr lang="en-GB" dirty="0"/>
+              <a:t>Your code</a:t>
+            </a:r>
+          </a:p>
+          <a:p>
+            <a:r>
+              <a:rPr lang="en-GB" dirty="0"/>
+              <a:t>With sufficient instructions from you to me that I can fathom how to use it</a:t>
+            </a:r>
+          </a:p>
+        </p:txBody>
+      </p:sp>
+    </p:spTree>
+    <p:extLst>
+      <p:ext uri="{BB962C8B-B14F-4D97-AF65-F5344CB8AC3E}">
+        <p14:creationId xmlns:p14="http://schemas.microsoft.com/office/powerpoint/2010/main" val="529706538"/>
+      </p:ext>
+    </p:extLst>
+  </p:cSld>
+  <p:clrMapOvr>
+    <a:masterClrMapping/>
+  </p:clrMapOvr>
+</p:sld>
+</file>
+
+<file path=ppt/slides/slide31.xml><?xml version="1.0" encoding="utf-8"?>
+<p:sld xmlns:a="http://schemas.openxmlformats.org/drawingml/2006/main" xmlns:r="http://schemas.openxmlformats.org/officeDocument/2006/relationships" xmlns:p="http://schemas.openxmlformats.org/presentationml/2006/main">
+  <p:cSld>
+    <p:spTree>
+      <p:nvGrpSpPr>
+        <p:cNvPr id="1" name=""/>
+        <p:cNvGrpSpPr/>
+        <p:nvPr/>
+      </p:nvGrpSpPr>
+      <p:grpSpPr>
+        <a:xfrm>
+          <a:off x="0" y="0"/>
+          <a:ext cx="0" cy="0"/>
+          <a:chOff x="0" y="0"/>
+          <a:chExt cx="0" cy="0"/>
+        </a:xfrm>
+      </p:grpSpPr>
+      <p:sp>
+        <p:nvSpPr>
+          <p:cNvPr id="2" name="Title 1">
+            <a:extLst>
+              <a:ext uri="{FF2B5EF4-FFF2-40B4-BE49-F238E27FC236}">
+                <a16:creationId xmlns:a16="http://schemas.microsoft.com/office/drawing/2014/main" id="{61A2BF9D-1813-4BCA-AA48-0082CABE99CF}"/>
+              </a:ext>
+            </a:extLst>
+          </p:cNvPr>
+          <p:cNvSpPr>
+            <a:spLocks noGrp="1"/>
+          </p:cNvSpPr>
+          <p:nvPr>
+            <p:ph type="title"/>
+          </p:nvPr>
+        </p:nvSpPr>
+        <p:spPr/>
+        <p:txBody>
+          <a:bodyPr/>
+          <a:lstStyle/>
+          <a:p>
+            <a:r>
+              <a:rPr lang="en-GB" dirty="0"/>
+              <a:t>Example Project #1</a:t>
+            </a:r>
+          </a:p>
+        </p:txBody>
+      </p:sp>
+      <p:sp>
+        <p:nvSpPr>
+          <p:cNvPr id="3" name="Content Placeholder 2">
+            <a:extLst>
+              <a:ext uri="{FF2B5EF4-FFF2-40B4-BE49-F238E27FC236}">
+                <a16:creationId xmlns:a16="http://schemas.microsoft.com/office/drawing/2014/main" id="{2A1823AA-7443-40D4-B38E-F7941597D6AF}"/>
+              </a:ext>
+            </a:extLst>
+          </p:cNvPr>
+          <p:cNvSpPr>
+            <a:spLocks noGrp="1"/>
+          </p:cNvSpPr>
+          <p:nvPr>
+            <p:ph idx="1"/>
+          </p:nvPr>
+        </p:nvSpPr>
+        <p:spPr/>
+        <p:txBody>
+          <a:bodyPr/>
+          <a:lstStyle/>
+          <a:p>
+            <a:r>
+              <a:rPr lang="en-GB" dirty="0"/>
+              <a:t>Arthur Conan Doyle’s ‘Sherlock Holmes’ vocabulary</a:t>
+            </a:r>
+          </a:p>
+          <a:p>
+            <a:pPr lvl="1"/>
+            <a:r>
+              <a:rPr lang="en-GB" dirty="0"/>
+              <a:t>The total vocabulary with word frequencies </a:t>
+            </a:r>
+          </a:p>
+          <a:p>
+            <a:pPr lvl="1"/>
+            <a:r>
+              <a:rPr lang="en-GB" dirty="0"/>
+              <a:t>The vocabulary of each written work</a:t>
+            </a:r>
+          </a:p>
+          <a:p>
+            <a:pPr lvl="1"/>
+            <a:r>
+              <a:rPr lang="en-GB" dirty="0"/>
+              <a:t>The vocabulary of novels compared to short stories</a:t>
+            </a:r>
+          </a:p>
+          <a:p>
+            <a:pPr lvl="1"/>
+            <a:r>
+              <a:rPr lang="en-GB" dirty="0"/>
+              <a:t>Changes in vocabulary over time</a:t>
+            </a:r>
+          </a:p>
+          <a:p>
+            <a:pPr lvl="1"/>
+            <a:endParaRPr lang="en-GB" dirty="0"/>
+          </a:p>
+          <a:p>
+            <a:pPr lvl="1"/>
+            <a:r>
+              <a:rPr lang="en-GB" dirty="0"/>
+              <a:t>Words ‘near’ the character Holmes</a:t>
+            </a:r>
+          </a:p>
+          <a:p>
+            <a:pPr lvl="1"/>
+            <a:r>
+              <a:rPr lang="en-GB" dirty="0"/>
+              <a:t>Words ‘near’ the character Watson</a:t>
+            </a:r>
+          </a:p>
+          <a:p>
+            <a:pPr lvl="1"/>
+            <a:r>
+              <a:rPr lang="en-GB" dirty="0"/>
+              <a:t>Words ‘near’ the </a:t>
+            </a:r>
+            <a:r>
+              <a:rPr lang="en-GB"/>
+              <a:t>character Moriarty</a:t>
+            </a:r>
+            <a:endParaRPr lang="en-GB" dirty="0"/>
+          </a:p>
+          <a:p>
+            <a:pPr lvl="1"/>
+            <a:endParaRPr lang="en-GB" dirty="0"/>
+          </a:p>
+        </p:txBody>
+      </p:sp>
+    </p:spTree>
+    <p:extLst>
+      <p:ext uri="{BB962C8B-B14F-4D97-AF65-F5344CB8AC3E}">
+        <p14:creationId xmlns:p14="http://schemas.microsoft.com/office/powerpoint/2010/main" val="909355150"/>
+      </p:ext>
+    </p:extLst>
+  </p:cSld>
+  <p:clrMapOvr>
+    <a:masterClrMapping/>
+  </p:clrMapOvr>
+</p:sld>
+</file>
+
+<file path=ppt/slides/slide32.xml><?xml version="1.0" encoding="utf-8"?>
+<p:sld xmlns:a="http://schemas.openxmlformats.org/drawingml/2006/main" xmlns:r="http://schemas.openxmlformats.org/officeDocument/2006/relationships" xmlns:p="http://schemas.openxmlformats.org/presentationml/2006/main">
+  <p:cSld>
+    <p:spTree>
+      <p:nvGrpSpPr>
+        <p:cNvPr id="1" name=""/>
+        <p:cNvGrpSpPr/>
+        <p:nvPr/>
+      </p:nvGrpSpPr>
+      <p:grpSpPr>
+        <a:xfrm>
+          <a:off x="0" y="0"/>
+          <a:ext cx="0" cy="0"/>
+          <a:chOff x="0" y="0"/>
+          <a:chExt cx="0" cy="0"/>
+        </a:xfrm>
+      </p:grpSpPr>
+      <p:sp>
+        <p:nvSpPr>
+          <p:cNvPr id="2" name="Title 1">
+            <a:extLst>
+              <a:ext uri="{FF2B5EF4-FFF2-40B4-BE49-F238E27FC236}">
+                <a16:creationId xmlns:a16="http://schemas.microsoft.com/office/drawing/2014/main" id="{9EA3C4C8-AB99-40B0-B082-4934ADD40397}"/>
+              </a:ext>
+            </a:extLst>
+          </p:cNvPr>
+          <p:cNvSpPr>
+            <a:spLocks noGrp="1"/>
+          </p:cNvSpPr>
+          <p:nvPr>
+            <p:ph type="title"/>
+          </p:nvPr>
+        </p:nvSpPr>
+        <p:spPr/>
+        <p:txBody>
+          <a:bodyPr/>
+          <a:lstStyle/>
+          <a:p>
+            <a:r>
+              <a:rPr lang="en-GB" dirty="0" err="1"/>
+              <a:t>MarkDown</a:t>
+            </a:r>
+            <a:endParaRPr lang="en-GB" dirty="0"/>
+          </a:p>
+        </p:txBody>
+      </p:sp>
+      <p:sp>
+        <p:nvSpPr>
+          <p:cNvPr id="3" name="Text Placeholder 2">
+            <a:extLst>
+              <a:ext uri="{FF2B5EF4-FFF2-40B4-BE49-F238E27FC236}">
+                <a16:creationId xmlns:a16="http://schemas.microsoft.com/office/drawing/2014/main" id="{E40F044D-AB5D-4817-8638-E8674D6D793C}"/>
+              </a:ext>
+            </a:extLst>
+          </p:cNvPr>
+          <p:cNvSpPr>
+            <a:spLocks noGrp="1"/>
+          </p:cNvSpPr>
+          <p:nvPr>
+            <p:ph type="body" idx="1"/>
+          </p:nvPr>
+        </p:nvSpPr>
+        <p:spPr/>
+        <p:txBody>
+          <a:bodyPr/>
+          <a:lstStyle/>
+          <a:p>
+            <a:r>
+              <a:rPr lang="en-GB" dirty="0"/>
+              <a:t>Examples &amp; Guide</a:t>
+            </a:r>
+          </a:p>
+        </p:txBody>
+      </p:sp>
+    </p:spTree>
+    <p:extLst>
+      <p:ext uri="{BB962C8B-B14F-4D97-AF65-F5344CB8AC3E}">
+        <p14:creationId xmlns:p14="http://schemas.microsoft.com/office/powerpoint/2010/main" val="2149790795"/>
+      </p:ext>
+    </p:extLst>
+  </p:cSld>
+  <p:clrMapOvr>
+    <a:masterClrMapping/>
+  </p:clrMapOvr>
+</p:sld>
+</file>
+
+<file path=ppt/slides/slide33.xml><?xml version="1.0" encoding="utf-8"?>
+<p:sld xmlns:a="http://schemas.openxmlformats.org/drawingml/2006/main" xmlns:r="http://schemas.openxmlformats.org/officeDocument/2006/relationships" xmlns:p="http://schemas.openxmlformats.org/presentationml/2006/main">
+  <p:cSld>
+    <p:spTree>
+      <p:nvGrpSpPr>
+        <p:cNvPr id="1" name=""/>
+        <p:cNvGrpSpPr/>
+        <p:nvPr/>
+      </p:nvGrpSpPr>
+      <p:grpSpPr>
+        <a:xfrm>
+          <a:off x="0" y="0"/>
+          <a:ext cx="0" cy="0"/>
+          <a:chOff x="0" y="0"/>
+          <a:chExt cx="0" cy="0"/>
+        </a:xfrm>
+      </p:grpSpPr>
+      <p:pic>
+        <p:nvPicPr>
+          <p:cNvPr id="6" name="Picture 5">
+            <a:extLst>
+              <a:ext uri="{FF2B5EF4-FFF2-40B4-BE49-F238E27FC236}">
+                <a16:creationId xmlns:a16="http://schemas.microsoft.com/office/drawing/2014/main" id="{A0EFA0AE-3AEA-4829-BEB9-CE4589AFC723}"/>
+              </a:ext>
+            </a:extLst>
+          </p:cNvPr>
+          <p:cNvPicPr>
+            <a:picLocks noChangeAspect="1"/>
+          </p:cNvPicPr>
+          <p:nvPr/>
+        </p:nvPicPr>
+        <p:blipFill>
+          <a:blip r:embed="rId2"/>
+          <a:stretch>
+            <a:fillRect/>
+          </a:stretch>
+        </p:blipFill>
+        <p:spPr>
+          <a:xfrm>
+            <a:off x="1611788" y="3172113"/>
+            <a:ext cx="8968425" cy="3365625"/>
+          </a:xfrm>
+          <a:prstGeom prst="rect">
+            <a:avLst/>
+          </a:prstGeom>
+        </p:spPr>
+      </p:pic>
+      <p:pic>
+        <p:nvPicPr>
+          <p:cNvPr id="4" name="Picture 3">
+            <a:extLst>
+              <a:ext uri="{FF2B5EF4-FFF2-40B4-BE49-F238E27FC236}">
+                <a16:creationId xmlns:a16="http://schemas.microsoft.com/office/drawing/2014/main" id="{EA7A5E45-A25B-4379-BF62-4820F491607A}"/>
+              </a:ext>
+            </a:extLst>
+          </p:cNvPr>
+          <p:cNvPicPr>
+            <a:picLocks noChangeAspect="1"/>
+          </p:cNvPicPr>
+          <p:nvPr/>
+        </p:nvPicPr>
+        <p:blipFill>
+          <a:blip r:embed="rId3"/>
+          <a:stretch>
+            <a:fillRect/>
+          </a:stretch>
+        </p:blipFill>
+        <p:spPr>
+          <a:xfrm>
+            <a:off x="1611788" y="343046"/>
+            <a:ext cx="8968424" cy="2660918"/>
+          </a:xfrm>
+          <a:prstGeom prst="rect">
+            <a:avLst/>
+          </a:prstGeom>
+        </p:spPr>
+      </p:pic>
+    </p:spTree>
+    <p:extLst>
+      <p:ext uri="{BB962C8B-B14F-4D97-AF65-F5344CB8AC3E}">
+        <p14:creationId xmlns:p14="http://schemas.microsoft.com/office/powerpoint/2010/main" val="286071469"/>
+      </p:ext>
+    </p:extLst>
+  </p:cSld>
+  <p:clrMapOvr>
+    <a:masterClrMapping/>
+  </p:clrMapOvr>
+</p:sld>
+</file>
+
+<file path=ppt/slides/slide34.xml><?xml version="1.0" encoding="utf-8"?>
+<p:sld xmlns:a="http://schemas.openxmlformats.org/drawingml/2006/main" xmlns:r="http://schemas.openxmlformats.org/officeDocument/2006/relationships" xmlns:p="http://schemas.openxmlformats.org/presentationml/2006/main">
+  <p:cSld>
+    <p:spTree>
+      <p:nvGrpSpPr>
+        <p:cNvPr id="1" name=""/>
+        <p:cNvGrpSpPr/>
+        <p:nvPr/>
+      </p:nvGrpSpPr>
+      <p:grpSpPr>
+        <a:xfrm>
+          <a:off x="0" y="0"/>
+          <a:ext cx="0" cy="0"/>
+          <a:chOff x="0" y="0"/>
+          <a:chExt cx="0" cy="0"/>
+        </a:xfrm>
+      </p:grpSpPr>
+      <p:sp>
+        <p:nvSpPr>
+          <p:cNvPr id="2" name="Title 1">
+            <a:extLst>
+              <a:ext uri="{FF2B5EF4-FFF2-40B4-BE49-F238E27FC236}">
+                <a16:creationId xmlns:a16="http://schemas.microsoft.com/office/drawing/2014/main" id="{F4E791DF-A973-4C41-A007-F1CD3F3AA1AF}"/>
+              </a:ext>
+            </a:extLst>
+          </p:cNvPr>
+          <p:cNvSpPr>
+            <a:spLocks noGrp="1"/>
+          </p:cNvSpPr>
+          <p:nvPr>
+            <p:ph type="title"/>
+          </p:nvPr>
+        </p:nvSpPr>
+        <p:spPr/>
+        <p:txBody>
+          <a:bodyPr/>
+          <a:lstStyle/>
+          <a:p>
+            <a:r>
+              <a:rPr lang="en-GB" dirty="0"/>
+              <a:t>Markdown Syntax</a:t>
+            </a:r>
+          </a:p>
+        </p:txBody>
+      </p:sp>
+      <p:sp>
+        <p:nvSpPr>
+          <p:cNvPr id="3" name="Content Placeholder 2">
+            <a:extLst>
+              <a:ext uri="{FF2B5EF4-FFF2-40B4-BE49-F238E27FC236}">
+                <a16:creationId xmlns:a16="http://schemas.microsoft.com/office/drawing/2014/main" id="{00A9BBF6-F358-4956-A881-978B56B99735}"/>
+              </a:ext>
+            </a:extLst>
+          </p:cNvPr>
+          <p:cNvSpPr>
+            <a:spLocks noGrp="1"/>
+          </p:cNvSpPr>
+          <p:nvPr>
+            <p:ph sz="half" idx="1"/>
+          </p:nvPr>
+        </p:nvSpPr>
+        <p:spPr/>
+        <p:txBody>
+          <a:bodyPr>
+            <a:normAutofit/>
+          </a:bodyPr>
+          <a:lstStyle/>
+          <a:p>
+            <a:pPr marL="0" indent="0">
+              <a:buNone/>
+            </a:pPr>
+            <a:r>
+              <a:rPr lang="en-GB" dirty="0"/>
+              <a:t># Headers</a:t>
+            </a:r>
+          </a:p>
+          <a:p>
+            <a:pPr marL="0" indent="0">
+              <a:buNone/>
+            </a:pPr>
+            <a:r>
+              <a:rPr lang="en-GB" dirty="0"/>
+              <a:t>* Bullet list</a:t>
+            </a:r>
+          </a:p>
+          <a:p>
+            <a:pPr marL="0" indent="0">
+              <a:buNone/>
+            </a:pPr>
+            <a:r>
+              <a:rPr lang="en-GB" dirty="0"/>
+              <a:t>1. Numbered list</a:t>
+            </a:r>
+          </a:p>
+          <a:p>
+            <a:pPr marL="0" indent="0">
+              <a:buNone/>
+            </a:pPr>
+            <a:endParaRPr lang="en-GB" dirty="0"/>
+          </a:p>
+          <a:p>
+            <a:pPr marL="0" indent="0">
+              <a:buNone/>
+            </a:pPr>
+            <a:r>
+              <a:rPr lang="en-GB" dirty="0"/>
+              <a:t>Column 1 | Column 2</a:t>
+            </a:r>
+          </a:p>
+          <a:p>
+            <a:pPr marL="0" indent="0">
+              <a:buNone/>
+            </a:pPr>
+            <a:r>
+              <a:rPr lang="en-GB" dirty="0"/>
+              <a:t>--------------|-------------</a:t>
+            </a:r>
+          </a:p>
+          <a:p>
+            <a:pPr marL="0" indent="0">
+              <a:buNone/>
+            </a:pPr>
+            <a:r>
+              <a:rPr lang="en-GB" dirty="0"/>
+              <a:t>Col 1 cell 1 | col 2 cell 1</a:t>
+            </a:r>
+          </a:p>
+          <a:p>
+            <a:pPr marL="0" indent="0">
+              <a:buNone/>
+            </a:pPr>
+            <a:r>
+              <a:rPr lang="en-GB" dirty="0"/>
+              <a:t>Col 1 cell 2 | col 2 cell 2</a:t>
+            </a:r>
+          </a:p>
+          <a:p>
+            <a:pPr marL="0" indent="0">
+              <a:buNone/>
+            </a:pPr>
+            <a:endParaRPr lang="en-GB" dirty="0"/>
+          </a:p>
+          <a:p>
+            <a:pPr marL="0" indent="0">
+              <a:buNone/>
+            </a:pPr>
+            <a:endParaRPr lang="en-GB" dirty="0"/>
+          </a:p>
+        </p:txBody>
+      </p:sp>
+      <p:sp>
+        <p:nvSpPr>
+          <p:cNvPr id="4" name="Content Placeholder 3">
+            <a:extLst>
+              <a:ext uri="{FF2B5EF4-FFF2-40B4-BE49-F238E27FC236}">
+                <a16:creationId xmlns:a16="http://schemas.microsoft.com/office/drawing/2014/main" id="{95901C54-1A7F-4FEF-8F0E-C936FC9C7870}"/>
+              </a:ext>
+            </a:extLst>
+          </p:cNvPr>
+          <p:cNvSpPr>
+            <a:spLocks noGrp="1"/>
+          </p:cNvSpPr>
+          <p:nvPr>
+            <p:ph sz="half" idx="2"/>
+          </p:nvPr>
+        </p:nvSpPr>
+        <p:spPr/>
+        <p:txBody>
+          <a:bodyPr>
+            <a:normAutofit/>
+          </a:bodyPr>
+          <a:lstStyle/>
+          <a:p>
+            <a:pPr marL="0" indent="0">
+              <a:buNone/>
+            </a:pPr>
+            <a:r>
+              <a:rPr lang="en-GB" dirty="0"/>
+              <a:t>*italic* or _italic_</a:t>
+            </a:r>
+          </a:p>
+          <a:p>
+            <a:pPr marL="0" indent="0">
+              <a:buNone/>
+            </a:pPr>
+            <a:r>
+              <a:rPr lang="en-GB" dirty="0"/>
+              <a:t>**bold** or __bold__</a:t>
+            </a:r>
+          </a:p>
+          <a:p>
+            <a:pPr marL="0" indent="0">
+              <a:buNone/>
+            </a:pPr>
+            <a:r>
+              <a:rPr lang="en-GB" dirty="0"/>
+              <a:t>- [ ] to-do item</a:t>
+            </a:r>
+          </a:p>
+          <a:p>
+            <a:pPr marL="0" indent="0">
+              <a:buNone/>
+            </a:pPr>
+            <a:r>
+              <a:rPr lang="en-GB" dirty="0"/>
+              <a:t>- [x] to-do item done</a:t>
+            </a:r>
+          </a:p>
+          <a:p>
+            <a:pPr marL="0" indent="0">
+              <a:buNone/>
+            </a:pPr>
+            <a:r>
+              <a:rPr lang="en-GB" dirty="0"/>
+              <a:t>’’’ code block ’’’</a:t>
+            </a:r>
+          </a:p>
+          <a:p>
+            <a:pPr marL="0" indent="0">
+              <a:buNone/>
+            </a:pPr>
+            <a:r>
+              <a:rPr lang="en-GB" dirty="0"/>
+              <a:t>Blockquote</a:t>
+            </a:r>
+          </a:p>
+          <a:p>
+            <a:pPr marL="0" indent="0">
+              <a:buNone/>
+            </a:pPr>
+            <a:r>
+              <a:rPr lang="en-GB" dirty="0"/>
+              <a:t>![image](URL)</a:t>
+            </a:r>
+          </a:p>
+          <a:p>
+            <a:pPr marL="0" indent="0">
+              <a:buNone/>
+            </a:pPr>
+            <a:r>
+              <a:rPr lang="en-GB" dirty="0"/>
+              <a:t>[link](URL)</a:t>
+            </a:r>
+          </a:p>
+        </p:txBody>
+      </p:sp>
+    </p:spTree>
+    <p:extLst>
+      <p:ext uri="{BB962C8B-B14F-4D97-AF65-F5344CB8AC3E}">
+        <p14:creationId xmlns:p14="http://schemas.microsoft.com/office/powerpoint/2010/main" val="665662692"/>
+      </p:ext>
+    </p:extLst>
+  </p:cSld>
+  <p:clrMapOvr>
+    <a:masterClrMapping/>
+  </p:clrMapOvr>
+</p:sld>
+</file>
+
+<file path=ppt/slides/slide35.xml><?xml version="1.0" encoding="utf-8"?>
+<p:sld xmlns:a="http://schemas.openxmlformats.org/drawingml/2006/main" xmlns:r="http://schemas.openxmlformats.org/officeDocument/2006/relationships" xmlns:p="http://schemas.openxmlformats.org/presentationml/2006/main">
+  <p:cSld>
+    <p:spTree>
+      <p:nvGrpSpPr>
+        <p:cNvPr id="1" name=""/>
+        <p:cNvGrpSpPr/>
+        <p:nvPr/>
+      </p:nvGrpSpPr>
+      <p:grpSpPr>
+        <a:xfrm>
+          <a:off x="0" y="0"/>
+          <a:ext cx="0" cy="0"/>
+          <a:chOff x="0" y="0"/>
+          <a:chExt cx="0" cy="0"/>
+        </a:xfrm>
+      </p:grpSpPr>
+      <p:sp>
+        <p:nvSpPr>
+          <p:cNvPr id="2" name="Title 1">
+            <a:extLst>
+              <a:ext uri="{FF2B5EF4-FFF2-40B4-BE49-F238E27FC236}">
+                <a16:creationId xmlns:a16="http://schemas.microsoft.com/office/drawing/2014/main" id="{E683B49C-1482-46BE-BE0B-630F901867BA}"/>
+              </a:ext>
+            </a:extLst>
+          </p:cNvPr>
+          <p:cNvSpPr>
+            <a:spLocks noGrp="1"/>
+          </p:cNvSpPr>
+          <p:nvPr>
+            <p:ph type="title"/>
+          </p:nvPr>
+        </p:nvSpPr>
+        <p:spPr/>
+        <p:txBody>
+          <a:bodyPr/>
+          <a:lstStyle/>
+          <a:p>
+            <a:r>
+              <a:rPr lang="en-GB" dirty="0"/>
+              <a:t>Markdown</a:t>
+            </a:r>
+            <a:br>
+              <a:rPr lang="en-GB" dirty="0"/>
+            </a:br>
+            <a:r>
+              <a:rPr lang="en-GB" dirty="0"/>
+              <a:t>Syntax</a:t>
+            </a:r>
+          </a:p>
+        </p:txBody>
+      </p:sp>
+      <p:sp>
+        <p:nvSpPr>
+          <p:cNvPr id="4" name="Text Placeholder 3">
+            <a:extLst>
+              <a:ext uri="{FF2B5EF4-FFF2-40B4-BE49-F238E27FC236}">
+                <a16:creationId xmlns:a16="http://schemas.microsoft.com/office/drawing/2014/main" id="{6BEEFE95-563F-4B5F-99F6-17DA5783DA11}"/>
+              </a:ext>
+            </a:extLst>
+          </p:cNvPr>
+          <p:cNvSpPr>
+            <a:spLocks noGrp="1"/>
+          </p:cNvSpPr>
+          <p:nvPr>
+            <p:ph type="body" sz="half" idx="2"/>
+          </p:nvPr>
+        </p:nvSpPr>
+        <p:spPr/>
+        <p:txBody>
+          <a:bodyPr/>
+          <a:lstStyle/>
+          <a:p>
+            <a:r>
+              <a:rPr lang="en-GB" dirty="0"/>
+              <a:t>Handy guide in this lessons resources folder</a:t>
+            </a:r>
+          </a:p>
+        </p:txBody>
+      </p:sp>
+      <p:pic>
+        <p:nvPicPr>
+          <p:cNvPr id="6" name="Picture 5">
+            <a:extLst>
+              <a:ext uri="{FF2B5EF4-FFF2-40B4-BE49-F238E27FC236}">
+                <a16:creationId xmlns:a16="http://schemas.microsoft.com/office/drawing/2014/main" id="{4FD60452-F35E-49D6-B056-A92FA4EB504B}"/>
+              </a:ext>
+            </a:extLst>
+          </p:cNvPr>
+          <p:cNvPicPr>
+            <a:picLocks noChangeAspect="1"/>
+          </p:cNvPicPr>
+          <p:nvPr/>
+        </p:nvPicPr>
+        <p:blipFill>
+          <a:blip r:embed="rId2"/>
+          <a:stretch>
+            <a:fillRect/>
+          </a:stretch>
+        </p:blipFill>
+        <p:spPr>
+          <a:xfrm>
+            <a:off x="5850859" y="256207"/>
+            <a:ext cx="4887820" cy="6177089"/>
+          </a:xfrm>
+          <a:prstGeom prst="rect">
+            <a:avLst/>
+          </a:prstGeom>
+        </p:spPr>
+      </p:pic>
+    </p:spTree>
+    <p:extLst>
+      <p:ext uri="{BB962C8B-B14F-4D97-AF65-F5344CB8AC3E}">
+        <p14:creationId xmlns:p14="http://schemas.microsoft.com/office/powerpoint/2010/main" val="2031365247"/>
+      </p:ext>
+    </p:extLst>
+  </p:cSld>
+  <p:clrMapOvr>
+    <a:masterClrMapping/>
+  </p:clrMapOvr>
+</p:sld>
+</file>
+
+<file path=ppt/slides/slide36.xml><?xml version="1.0" encoding="utf-8"?>
+<p:sld xmlns:a="http://schemas.openxmlformats.org/drawingml/2006/main" xmlns:r="http://schemas.openxmlformats.org/officeDocument/2006/relationships" xmlns:p="http://schemas.openxmlformats.org/presentationml/2006/main">
+  <p:cSld>
+    <p:spTree>
+      <p:nvGrpSpPr>
+        <p:cNvPr id="1" name=""/>
+        <p:cNvGrpSpPr/>
+        <p:nvPr/>
+      </p:nvGrpSpPr>
+      <p:grpSpPr>
+        <a:xfrm>
+          <a:off x="0" y="0"/>
+          <a:ext cx="0" cy="0"/>
+          <a:chOff x="0" y="0"/>
+          <a:chExt cx="0" cy="0"/>
+        </a:xfrm>
+      </p:grpSpPr>
+      <p:sp>
+        <p:nvSpPr>
+          <p:cNvPr id="2" name="Title 1">
+            <a:extLst>
+              <a:ext uri="{FF2B5EF4-FFF2-40B4-BE49-F238E27FC236}">
+                <a16:creationId xmlns:a16="http://schemas.microsoft.com/office/drawing/2014/main" id="{40BCEAE3-B2E9-4893-9F60-8984C7D38926}"/>
+              </a:ext>
+            </a:extLst>
+          </p:cNvPr>
+          <p:cNvSpPr>
+            <a:spLocks noGrp="1"/>
+          </p:cNvSpPr>
+          <p:nvPr>
+            <p:ph type="title"/>
+          </p:nvPr>
+        </p:nvSpPr>
+        <p:spPr/>
+        <p:txBody>
+          <a:bodyPr/>
+          <a:lstStyle/>
+          <a:p>
+            <a:r>
+              <a:rPr lang="en-GB" dirty="0"/>
+              <a:t>Jupyter &amp; Markdown Practice - </a:t>
+            </a:r>
+          </a:p>
+        </p:txBody>
+      </p:sp>
+      <p:sp>
+        <p:nvSpPr>
+          <p:cNvPr id="3" name="Content Placeholder 2">
+            <a:extLst>
+              <a:ext uri="{FF2B5EF4-FFF2-40B4-BE49-F238E27FC236}">
+                <a16:creationId xmlns:a16="http://schemas.microsoft.com/office/drawing/2014/main" id="{D6130303-D165-4BFC-B88F-99DF12B12710}"/>
+              </a:ext>
+            </a:extLst>
+          </p:cNvPr>
+          <p:cNvSpPr>
+            <a:spLocks noGrp="1"/>
+          </p:cNvSpPr>
+          <p:nvPr>
+            <p:ph idx="1"/>
+          </p:nvPr>
+        </p:nvSpPr>
+        <p:spPr/>
+        <p:txBody>
+          <a:bodyPr/>
+          <a:lstStyle/>
+          <a:p>
+            <a:r>
+              <a:rPr lang="en-GB" dirty="0"/>
+              <a:t>Copy one of your assignment functions into a Jupyter notebook</a:t>
+            </a:r>
+          </a:p>
+          <a:p>
+            <a:r>
+              <a:rPr lang="en-GB" dirty="0"/>
+              <a:t>Execute it and test it </a:t>
+            </a:r>
+          </a:p>
+          <a:p>
+            <a:r>
+              <a:rPr lang="en-GB" dirty="0"/>
+              <a:t>Add brief documentation to your function using </a:t>
+            </a:r>
+            <a:r>
+              <a:rPr lang="en-GB" dirty="0" err="1"/>
+              <a:t>MarkDown</a:t>
+            </a:r>
+            <a:endParaRPr lang="en-GB" dirty="0"/>
+          </a:p>
+          <a:p>
+            <a:r>
+              <a:rPr lang="en-GB" dirty="0"/>
+              <a:t>Test your function with ‘assert’ statements</a:t>
+            </a:r>
+          </a:p>
+          <a:p>
+            <a:endParaRPr lang="en-GB" dirty="0"/>
+          </a:p>
+          <a:p>
+            <a:r>
+              <a:rPr lang="en-GB" dirty="0"/>
+              <a:t>Start writing your project specification in a Jupyter notebook with </a:t>
+            </a:r>
+            <a:r>
+              <a:rPr lang="en-GB"/>
+              <a:t>MarkDown</a:t>
+            </a:r>
+            <a:endParaRPr lang="en-GB" dirty="0"/>
+          </a:p>
+        </p:txBody>
+      </p:sp>
+    </p:spTree>
+    <p:extLst>
+      <p:ext uri="{BB962C8B-B14F-4D97-AF65-F5344CB8AC3E}">
+        <p14:creationId xmlns:p14="http://schemas.microsoft.com/office/powerpoint/2010/main" val="295967282"/>
+      </p:ext>
+    </p:extLst>
+  </p:cSld>
+  <p:clrMapOvr>
+    <a:masterClrMapping/>
+  </p:clrMapOvr>
 </p:sld>
 </file>
 
@@ -9727,7 +12331,7 @@
           <a:p>
             <a:r>
               <a:rPr lang="en-GB" dirty="0"/>
-              <a:t>Your coding notebook – running code!</a:t>
+              <a:t>Your coding notebook</a:t>
             </a:r>
           </a:p>
         </p:txBody>

</xml_diff>